<commit_message>
forsatt arbeid på slides
</commit_message>
<xml_diff>
--- a/SemWebKursUiB.pptx
+++ b/SemWebKursUiB.pptx
@@ -5,28 +5,24 @@
     <p:sldMasterId id="2147483648" r:id="rId1"/>
   </p:sldMasterIdLst>
   <p:notesMasterIdLst>
-    <p:notesMasterId r:id="rId18"/>
+    <p:notesMasterId r:id="rId14"/>
   </p:notesMasterIdLst>
   <p:handoutMasterIdLst>
-    <p:handoutMasterId r:id="rId19"/>
+    <p:handoutMasterId r:id="rId15"/>
   </p:handoutMasterIdLst>
   <p:sldIdLst>
-    <p:sldId id="256" r:id="rId2"/>
-    <p:sldId id="257" r:id="rId3"/>
-    <p:sldId id="282" r:id="rId4"/>
-    <p:sldId id="259" r:id="rId5"/>
-    <p:sldId id="264" r:id="rId6"/>
-    <p:sldId id="297" r:id="rId7"/>
-    <p:sldId id="298" r:id="rId8"/>
-    <p:sldId id="266" r:id="rId9"/>
-    <p:sldId id="285" r:id="rId10"/>
-    <p:sldId id="286" r:id="rId11"/>
-    <p:sldId id="279" r:id="rId12"/>
-    <p:sldId id="291" r:id="rId13"/>
-    <p:sldId id="292" r:id="rId14"/>
-    <p:sldId id="293" r:id="rId15"/>
-    <p:sldId id="295" r:id="rId16"/>
-    <p:sldId id="296" r:id="rId17"/>
+    <p:sldId id="297" r:id="rId2"/>
+    <p:sldId id="300" r:id="rId3"/>
+    <p:sldId id="301" r:id="rId4"/>
+    <p:sldId id="312" r:id="rId5"/>
+    <p:sldId id="299" r:id="rId6"/>
+    <p:sldId id="306" r:id="rId7"/>
+    <p:sldId id="307" r:id="rId8"/>
+    <p:sldId id="308" r:id="rId9"/>
+    <p:sldId id="309" r:id="rId10"/>
+    <p:sldId id="310" r:id="rId11"/>
+    <p:sldId id="311" r:id="rId12"/>
+    <p:sldId id="298" r:id="rId13"/>
   </p:sldIdLst>
   <p:sldSz cx="9145588" cy="5145088"/>
   <p:notesSz cx="6858000" cy="9144000"/>
@@ -126,6 +122,38 @@
     </a:lvl9pPr>
   </p:defaultTextStyle>
   <p:extLst>
+    <p:ext uri="{521415D9-36F7-43E2-AB2F-B90AF26B5E84}">
+      <p14:sectionLst xmlns:p14="http://schemas.microsoft.com/office/powerpoint/2010/main">
+        <p14:section name="Introduksjon" id="{A33226DD-EDB2-4FC3-A197-0DC18522BF09}">
+          <p14:sldIdLst>
+            <p14:sldId id="297"/>
+            <p14:sldId id="300"/>
+          </p14:sldIdLst>
+        </p14:section>
+        <p14:section name="Om Computas" id="{7AF25A94-402D-4276-8AC2-1D8B7F8F444C}">
+          <p14:sldIdLst>
+            <p14:sldId id="301"/>
+            <p14:sldId id="312"/>
+          </p14:sldIdLst>
+        </p14:section>
+        <p14:section name="Kurs" id="{BAF516D8-1506-4CE6-97C1-8269B0A4F6DC}">
+          <p14:sldIdLst>
+            <p14:sldId id="299"/>
+            <p14:sldId id="306"/>
+            <p14:sldId id="307"/>
+            <p14:sldId id="308"/>
+            <p14:sldId id="309"/>
+            <p14:sldId id="310"/>
+            <p14:sldId id="311"/>
+          </p14:sldIdLst>
+        </p14:section>
+        <p14:section name="Slutt" id="{DCD72681-9FBD-477A-8110-344290A2A1E9}">
+          <p14:sldIdLst>
+            <p14:sldId id="298"/>
+          </p14:sldIdLst>
+        </p14:section>
+      </p14:sectionLst>
+    </p:ext>
     <p:ext uri="{EFAFB233-063F-42B5-8137-9DF3F51BA10A}">
       <p15:sldGuideLst xmlns:p15="http://schemas.microsoft.com/office/powerpoint/2012/main">
         <p15:guide id="1" orient="horz" pos="1621">
@@ -692,7 +720,7 @@
       </p:grpSpPr>
       <p:sp>
         <p:nvSpPr>
-          <p:cNvPr id="2" name="Plassholder for lysbilde 1"/>
+          <p:cNvPr id="2" name="Slide Image Placeholder 1"/>
           <p:cNvSpPr>
             <a:spLocks noGrp="1" noRot="1" noChangeAspect="1"/>
           </p:cNvSpPr>
@@ -704,7 +732,7 @@
       </p:sp>
       <p:sp>
         <p:nvSpPr>
-          <p:cNvPr id="3" name="Plassholder for notater 2"/>
+          <p:cNvPr id="3" name="Notes Placeholder 2"/>
           <p:cNvSpPr>
             <a:spLocks noGrp="1"/>
           </p:cNvSpPr>
@@ -717,13 +745,13 @@
           <a:bodyPr/>
           <a:lstStyle/>
           <a:p>
-            <a:endParaRPr lang="nb-NO"/>
-          </a:p>
-        </p:txBody>
-      </p:sp>
-      <p:sp>
-        <p:nvSpPr>
-          <p:cNvPr id="4" name="Plassholder for lysbildenummer 3"/>
+            <a:endParaRPr lang="nb-NO" dirty="0"/>
+          </a:p>
+        </p:txBody>
+      </p:sp>
+      <p:sp>
+        <p:nvSpPr>
+          <p:cNvPr id="4" name="Slide Number Placeholder 3"/>
           <p:cNvSpPr>
             <a:spLocks noGrp="1"/>
           </p:cNvSpPr>
@@ -738,7 +766,7 @@
           <a:p>
             <a:fld id="{D1371B71-9AB0-49F5-B1CB-094A5DA8B563}" type="slidenum">
               <a:rPr lang="nb-NO" smtClean="0"/>
-              <a:t>1</a:t>
+              <a:t>2</a:t>
             </a:fld>
             <a:endParaRPr lang="nb-NO"/>
           </a:p>
@@ -747,91 +775,7 @@
     </p:spTree>
     <p:extLst>
       <p:ext uri="{BB962C8B-B14F-4D97-AF65-F5344CB8AC3E}">
-        <p14:creationId xmlns:p14="http://schemas.microsoft.com/office/powerpoint/2010/main" val="2166652088"/>
-      </p:ext>
-    </p:extLst>
-  </p:cSld>
-  <p:clrMapOvr>
-    <a:masterClrMapping/>
-  </p:clrMapOvr>
-</p:notes>
-</file>
-
-<file path=ppt/notesSlides/notesSlide2.xml><?xml version="1.0" encoding="utf-8"?>
-<p:notes xmlns:a="http://schemas.openxmlformats.org/drawingml/2006/main" xmlns:r="http://schemas.openxmlformats.org/officeDocument/2006/relationships" xmlns:p="http://schemas.openxmlformats.org/presentationml/2006/main">
-  <p:cSld>
-    <p:spTree>
-      <p:nvGrpSpPr>
-        <p:cNvPr id="1" name=""/>
-        <p:cNvGrpSpPr/>
-        <p:nvPr/>
-      </p:nvGrpSpPr>
-      <p:grpSpPr>
-        <a:xfrm>
-          <a:off x="0" y="0"/>
-          <a:ext cx="0" cy="0"/>
-          <a:chOff x="0" y="0"/>
-          <a:chExt cx="0" cy="0"/>
-        </a:xfrm>
-      </p:grpSpPr>
-      <p:sp>
-        <p:nvSpPr>
-          <p:cNvPr id="2" name="Plassholder for lysbilde 1"/>
-          <p:cNvSpPr>
-            <a:spLocks noGrp="1" noRot="1" noChangeAspect="1"/>
-          </p:cNvSpPr>
-          <p:nvPr>
-            <p:ph type="sldImg"/>
-          </p:nvPr>
-        </p:nvSpPr>
-        <p:spPr/>
-      </p:sp>
-      <p:sp>
-        <p:nvSpPr>
-          <p:cNvPr id="3" name="Plassholder for notater 2"/>
-          <p:cNvSpPr>
-            <a:spLocks noGrp="1"/>
-          </p:cNvSpPr>
-          <p:nvPr>
-            <p:ph type="body" idx="1"/>
-          </p:nvPr>
-        </p:nvSpPr>
-        <p:spPr/>
-        <p:txBody>
-          <a:bodyPr/>
-          <a:lstStyle/>
-          <a:p>
-            <a:endParaRPr lang="nb-NO" dirty="0"/>
-          </a:p>
-        </p:txBody>
-      </p:sp>
-      <p:sp>
-        <p:nvSpPr>
-          <p:cNvPr id="4" name="Plassholder for lysbildenummer 3"/>
-          <p:cNvSpPr>
-            <a:spLocks noGrp="1"/>
-          </p:cNvSpPr>
-          <p:nvPr>
-            <p:ph type="sldNum" sz="quarter" idx="10"/>
-          </p:nvPr>
-        </p:nvSpPr>
-        <p:spPr/>
-        <p:txBody>
-          <a:bodyPr/>
-          <a:lstStyle/>
-          <a:p>
-            <a:fld id="{D1371B71-9AB0-49F5-B1CB-094A5DA8B563}" type="slidenum">
-              <a:rPr lang="nb-NO" smtClean="0"/>
-              <a:t>12</a:t>
-            </a:fld>
-            <a:endParaRPr lang="nb-NO"/>
-          </a:p>
-        </p:txBody>
-      </p:sp>
-    </p:spTree>
-    <p:extLst>
-      <p:ext uri="{BB962C8B-B14F-4D97-AF65-F5344CB8AC3E}">
-        <p14:creationId xmlns:p14="http://schemas.microsoft.com/office/powerpoint/2010/main" val="1679477656"/>
+        <p14:creationId xmlns:p14="http://schemas.microsoft.com/office/powerpoint/2010/main" val="2467882102"/>
       </p:ext>
     </p:extLst>
   </p:cSld>
@@ -11716,21 +11660,6 @@
 <file path=ppt/slides/slide1.xml><?xml version="1.0" encoding="utf-8"?>
 <p:sld xmlns:a="http://schemas.openxmlformats.org/drawingml/2006/main" xmlns:r="http://schemas.openxmlformats.org/officeDocument/2006/relationships" xmlns:p="http://schemas.openxmlformats.org/presentationml/2006/main">
   <p:cSld>
-    <p:bg>
-      <p:bgPr>
-        <a:blipFill dpi="0" rotWithShape="1">
-          <a:blip r:embed="rId3">
-            <a:alphaModFix amt="0"/>
-            <a:lum/>
-          </a:blip>
-          <a:srcRect/>
-          <a:stretch>
-            <a:fillRect/>
-          </a:stretch>
-        </a:blipFill>
-        <a:effectLst/>
-      </p:bgPr>
-    </p:bg>
     <p:spTree>
       <p:nvGrpSpPr>
         <p:cNvPr id="1" name=""/>
@@ -11747,46 +11676,128 @@
       </p:grpSpPr>
       <p:sp>
         <p:nvSpPr>
-          <p:cNvPr id="2" name="TextBox 1"/>
-          <p:cNvSpPr txBox="1"/>
+          <p:cNvPr id="3" name="Rectangle 2"/>
+          <p:cNvSpPr/>
           <p:nvPr/>
         </p:nvSpPr>
         <p:spPr>
           <a:xfrm>
-            <a:off x="1476450" y="1225153"/>
-            <a:ext cx="6281495" cy="870014"/>
+            <a:off x="3420666" y="2742171"/>
+            <a:ext cx="5472607" cy="1754326"/>
           </a:xfrm>
           <a:prstGeom prst="rect">
             <a:avLst/>
           </a:prstGeom>
-          <a:solidFill>
-            <a:schemeClr val="bg1"/>
-          </a:solidFill>
-        </p:spPr>
-        <p:txBody>
-          <a:bodyPr wrap="none" lIns="126000" tIns="126000" rIns="126000" bIns="126000" rtlCol="0" anchor="b" anchorCtr="0">
+          <a:ln/>
+        </p:spPr>
+        <p:style>
+          <a:lnRef idx="2">
+            <a:schemeClr val="accent1"/>
+          </a:lnRef>
+          <a:fillRef idx="1">
+            <a:schemeClr val="lt1"/>
+          </a:fillRef>
+          <a:effectRef idx="0">
+            <a:schemeClr val="accent1"/>
+          </a:effectRef>
+          <a:fontRef idx="minor">
+            <a:schemeClr val="dk1"/>
+          </a:fontRef>
+        </p:style>
+        <p:txBody>
+          <a:bodyPr wrap="square" lIns="91440" tIns="45720" rIns="91440" bIns="45720">
             <a:spAutoFit/>
           </a:bodyPr>
           <a:lstStyle/>
           <a:p>
-            <a:r>
-              <a:rPr lang="nb-NO" sz="4000" dirty="0" smtClean="0">
-                <a:solidFill>
-                  <a:schemeClr val="accent5">
-                    <a:lumMod val="25000"/>
+            <a:pPr algn="ctr"/>
+            <a:r>
+              <a:rPr lang="en-US" sz="5400" b="0" cap="none" spc="0" dirty="0" err="1" smtClean="0">
+                <a:ln w="0"/>
+                <a:solidFill>
+                  <a:schemeClr val="tx1"/>
+                </a:solidFill>
+                <a:effectLst>
+                  <a:outerShdw blurRad="38100" dist="19050" dir="2700000" algn="tl" rotWithShape="0">
+                    <a:schemeClr val="dk1">
+                      <a:alpha val="40000"/>
+                    </a:schemeClr>
+                  </a:outerShdw>
+                </a:effectLst>
+              </a:rPr>
+              <a:t>Semantisk</a:t>
+            </a:r>
+            <a:r>
+              <a:rPr lang="en-US" sz="5400" b="0" cap="none" spc="0" dirty="0" smtClean="0">
+                <a:ln w="0"/>
+                <a:solidFill>
+                  <a:schemeClr val="tx1"/>
+                </a:solidFill>
+                <a:effectLst>
+                  <a:outerShdw blurRad="38100" dist="19050" dir="2700000" algn="tl" rotWithShape="0">
+                    <a:schemeClr val="dk1">
+                      <a:alpha val="40000"/>
+                    </a:schemeClr>
+                  </a:outerShdw>
+                </a:effectLst>
+              </a:rPr>
+              <a:t> Web </a:t>
+            </a:r>
+          </a:p>
+          <a:p>
+            <a:pPr algn="ctr"/>
+            <a:r>
+              <a:rPr lang="en-US" sz="5400" b="0" cap="none" spc="0" dirty="0" smtClean="0">
+                <a:ln w="0"/>
+                <a:solidFill>
+                  <a:schemeClr val="tx1"/>
+                </a:solidFill>
+                <a:effectLst>
+                  <a:outerShdw blurRad="38100" dist="19050" dir="2700000" algn="tl" rotWithShape="0">
+                    <a:schemeClr val="dk1">
+                      <a:alpha val="40000"/>
+                    </a:schemeClr>
+                  </a:outerShdw>
+                </a:effectLst>
+              </a:rPr>
+              <a:t>for </a:t>
+            </a:r>
+            <a:r>
+              <a:rPr lang="en-US" sz="5400" b="0" cap="none" spc="0" dirty="0" err="1" smtClean="0">
+                <a:ln w="0"/>
+                <a:solidFill>
+                  <a:schemeClr val="tx1"/>
+                </a:solidFill>
+                <a:effectLst>
+                  <a:outerShdw blurRad="38100" dist="19050" dir="2700000" algn="tl" rotWithShape="0">
+                    <a:schemeClr val="dk1">
+                      <a:alpha val="40000"/>
+                    </a:schemeClr>
+                  </a:outerShdw>
+                </a:effectLst>
+              </a:rPr>
+              <a:t>nybegynnere</a:t>
+            </a:r>
+            <a:endParaRPr lang="en-US" sz="5400" b="0" cap="none" spc="0" dirty="0">
+              <a:ln w="0"/>
+              <a:solidFill>
+                <a:schemeClr val="tx1"/>
+              </a:solidFill>
+              <a:effectLst>
+                <a:outerShdw blurRad="38100" dist="19050" dir="2700000" algn="tl" rotWithShape="0">
+                  <a:schemeClr val="dk1">
+                    <a:alpha val="40000"/>
                   </a:schemeClr>
-                </a:solidFill>
-                <a:cs typeface="DaunPenh" panose="01010101010101010101" pitchFamily="2" charset="0"/>
-              </a:rPr>
-              <a:t>SPARQL WEB PAGES (SWP)</a:t>
-            </a:r>
+                </a:outerShdw>
+              </a:effectLst>
+            </a:endParaRPr>
           </a:p>
         </p:txBody>
       </p:sp>
     </p:spTree>
     <p:extLst>
       <p:ext uri="{BB962C8B-B14F-4D97-AF65-F5344CB8AC3E}">
-        <p14:creationId xmlns:p14="http://schemas.microsoft.com/office/powerpoint/2010/main" val="3072324488"/>
+        <p14:creationId xmlns:p14="http://schemas.microsoft.com/office/powerpoint/2010/main" val="1432212531"/>
       </p:ext>
     </p:extLst>
   </p:cSld>
@@ -11822,7 +11833,7 @@
       </p:grpSpPr>
       <p:sp>
         <p:nvSpPr>
-          <p:cNvPr id="4" name="Tittel 3"/>
+          <p:cNvPr id="2" name="Title 1"/>
           <p:cNvSpPr>
             <a:spLocks noGrp="1"/>
           </p:cNvSpPr>
@@ -11830,19 +11841,14 @@
             <p:ph type="title"/>
           </p:nvPr>
         </p:nvSpPr>
-        <p:spPr>
-          <a:xfrm>
-            <a:off x="5436890" y="561670"/>
-            <a:ext cx="3388315" cy="276999"/>
-          </a:xfrm>
-        </p:spPr>
+        <p:spPr/>
         <p:txBody>
           <a:bodyPr/>
           <a:lstStyle/>
           <a:p>
             <a:r>
               <a:rPr lang="nb-NO" dirty="0" smtClean="0"/>
-              <a:t>TITTEL</a:t>
+              <a:t>Registrere Data</a:t>
             </a:r>
             <a:endParaRPr lang="nb-NO" dirty="0"/>
           </a:p>
@@ -11850,7 +11856,7 @@
       </p:sp>
       <p:sp>
         <p:nvSpPr>
-          <p:cNvPr id="5" name="Plassholder for innhold 4"/>
+          <p:cNvPr id="3" name="Content Placeholder 2"/>
           <p:cNvSpPr>
             <a:spLocks noGrp="1"/>
           </p:cNvSpPr>
@@ -11863,32 +11869,18 @@
           <a:bodyPr/>
           <a:lstStyle/>
           <a:p>
-            <a:pPr>
-              <a:lnSpc>
-                <a:spcPct val="140000"/>
-              </a:lnSpc>
-              <a:buSzPct val="100000"/>
-              <a:buFont typeface="Arial"/>
-              <a:buChar char="•"/>
-            </a:pPr>
-            <a:r>
-              <a:rPr lang="nb-NO" sz="1100" dirty="0" smtClean="0"/>
-              <a:t>Tekst</a:t>
-            </a:r>
-          </a:p>
-          <a:p>
-            <a:endParaRPr lang="nb-NO" dirty="0"/>
-          </a:p>
-        </p:txBody>
-      </p:sp>
-      <p:sp>
-        <p:nvSpPr>
-          <p:cNvPr id="6" name="Plassholder for tekst 5"/>
-          <p:cNvSpPr>
-            <a:spLocks noGrp="1"/>
-          </p:cNvSpPr>
-          <p:nvPr>
-            <p:ph type="body" sz="quarter" idx="13"/>
+            <a:endParaRPr lang="nb-NO"/>
+          </a:p>
+        </p:txBody>
+      </p:sp>
+      <p:sp>
+        <p:nvSpPr>
+          <p:cNvPr id="4" name="Slide Number Placeholder 3"/>
+          <p:cNvSpPr>
+            <a:spLocks noGrp="1"/>
+          </p:cNvSpPr>
+          <p:nvPr>
+            <p:ph type="sldNum" sz="quarter" idx="12"/>
           </p:nvPr>
         </p:nvSpPr>
         <p:spPr/>
@@ -11896,122 +11888,18 @@
           <a:bodyPr/>
           <a:lstStyle/>
           <a:p>
-            <a:endParaRPr lang="nb-NO"/>
-          </a:p>
-        </p:txBody>
-      </p:sp>
-      <p:sp>
-        <p:nvSpPr>
-          <p:cNvPr id="8" name="Plassholder for lysbildenummer 7"/>
-          <p:cNvSpPr>
-            <a:spLocks noGrp="1"/>
-          </p:cNvSpPr>
-          <p:nvPr>
-            <p:ph type="sldNum" sz="quarter" idx="4"/>
-          </p:nvPr>
-        </p:nvSpPr>
-        <p:spPr/>
-        <p:txBody>
-          <a:bodyPr/>
-          <a:lstStyle/>
-          <a:p>
             <a:fld id="{0AE548F1-6D36-4902-B57A-69A845AA9B7E}" type="slidenum">
               <a:rPr lang="nb-NO" smtClean="0"/>
-              <a:pPr/>
               <a:t>10</a:t>
             </a:fld>
             <a:endParaRPr lang="nb-NO" dirty="0"/>
           </a:p>
         </p:txBody>
       </p:sp>
-      <p:sp>
-        <p:nvSpPr>
-          <p:cNvPr id="9" name="Likebent trekant 8"/>
-          <p:cNvSpPr/>
-          <p:nvPr/>
-        </p:nvSpPr>
-        <p:spPr>
-          <a:xfrm rot="16200000" flipH="1">
-            <a:off x="4908830" y="2356520"/>
-            <a:ext cx="288032" cy="288032"/>
-          </a:xfrm>
-          <a:prstGeom prst="triangle">
-            <a:avLst/>
-          </a:prstGeom>
-          <a:solidFill>
-            <a:schemeClr val="bg1">
-              <a:lumMod val="95000"/>
-            </a:schemeClr>
-          </a:solidFill>
-          <a:ln>
-            <a:noFill/>
-          </a:ln>
-        </p:spPr>
-        <p:style>
-          <a:lnRef idx="2">
-            <a:schemeClr val="accent1">
-              <a:shade val="50000"/>
-            </a:schemeClr>
-          </a:lnRef>
-          <a:fillRef idx="1">
-            <a:schemeClr val="accent1"/>
-          </a:fillRef>
-          <a:effectRef idx="0">
-            <a:schemeClr val="accent1"/>
-          </a:effectRef>
-          <a:fontRef idx="minor">
-            <a:schemeClr val="lt1"/>
-          </a:fontRef>
-        </p:style>
-        <p:txBody>
-          <a:bodyPr rtlCol="0" anchor="ctr"/>
-          <a:lstStyle/>
-          <a:p>
-            <a:pPr algn="ctr"/>
-            <a:endParaRPr lang="nb-NO"/>
-          </a:p>
-        </p:txBody>
-      </p:sp>
-      <p:sp>
-        <p:nvSpPr>
-          <p:cNvPr id="2" name="Picture Placeholder 1"/>
-          <p:cNvSpPr>
-            <a:spLocks noGrp="1"/>
-          </p:cNvSpPr>
-          <p:nvPr>
-            <p:ph type="pic" sz="quarter" idx="16"/>
-          </p:nvPr>
-        </p:nvSpPr>
-        <p:spPr/>
-      </p:sp>
-      <p:sp>
-        <p:nvSpPr>
-          <p:cNvPr id="3" name="Picture Placeholder 2"/>
-          <p:cNvSpPr>
-            <a:spLocks noGrp="1"/>
-          </p:cNvSpPr>
-          <p:nvPr>
-            <p:ph type="pic" sz="quarter" idx="14"/>
-          </p:nvPr>
-        </p:nvSpPr>
-        <p:spPr/>
-      </p:sp>
-      <p:sp>
-        <p:nvSpPr>
-          <p:cNvPr id="7" name="Picture Placeholder 6"/>
-          <p:cNvSpPr>
-            <a:spLocks noGrp="1"/>
-          </p:cNvSpPr>
-          <p:nvPr>
-            <p:ph type="pic" sz="quarter" idx="15"/>
-          </p:nvPr>
-        </p:nvSpPr>
-        <p:spPr/>
-      </p:sp>
     </p:spTree>
     <p:extLst>
       <p:ext uri="{BB962C8B-B14F-4D97-AF65-F5344CB8AC3E}">
-        <p14:creationId xmlns:p14="http://schemas.microsoft.com/office/powerpoint/2010/main" val="806675675"/>
+        <p14:creationId xmlns:p14="http://schemas.microsoft.com/office/powerpoint/2010/main" val="2733868525"/>
       </p:ext>
     </p:extLst>
   </p:cSld>
@@ -12047,12 +11935,12 @@
       </p:grpSpPr>
       <p:sp>
         <p:nvSpPr>
-          <p:cNvPr id="12" name="Tittel 11"/>
-          <p:cNvSpPr>
-            <a:spLocks noGrp="1"/>
-          </p:cNvSpPr>
-          <p:nvPr>
-            <p:ph type="ctrTitle"/>
+          <p:cNvPr id="2" name="Title 1"/>
+          <p:cNvSpPr>
+            <a:spLocks noGrp="1"/>
+          </p:cNvSpPr>
+          <p:nvPr>
+            <p:ph type="title"/>
           </p:nvPr>
         </p:nvSpPr>
         <p:spPr/>
@@ -12062,52 +11950,20 @@
           <a:p>
             <a:r>
               <a:rPr lang="nb-NO" dirty="0" smtClean="0"/>
-              <a:t>SPIN </a:t>
-            </a:r>
-            <a:r>
-              <a:rPr lang="nb-NO" dirty="0" err="1" smtClean="0"/>
-              <a:t>Functions</a:t>
+              <a:t>Spørringer</a:t>
             </a:r>
             <a:endParaRPr lang="nb-NO" dirty="0"/>
           </a:p>
         </p:txBody>
       </p:sp>
-      <p:pic>
-        <p:nvPicPr>
-          <p:cNvPr id="14" name="Plassholder for bilde 13"/>
-          <p:cNvPicPr>
-            <a:picLocks noGrp="1" noChangeAspect="1"/>
-          </p:cNvPicPr>
-          <p:nvPr>
-            <p:ph type="pic" sz="quarter" idx="11"/>
-          </p:nvPr>
-        </p:nvPicPr>
-        <p:blipFill rotWithShape="1">
-          <a:blip r:embed="rId2">
-            <a:extLst>
-              <a:ext uri="{28A0092B-C50C-407E-A947-70E740481C1C}">
-                <a14:useLocalDpi xmlns:a14="http://schemas.microsoft.com/office/drawing/2010/main" val="0"/>
-              </a:ext>
-            </a:extLst>
-          </a:blip>
-          <a:srcRect l="-18127" t="-1" r="-18127" b="-10000"/>
-          <a:stretch/>
-        </p:blipFill>
-        <p:spPr>
-          <a:xfrm>
-            <a:off x="3276650" y="844352"/>
-            <a:ext cx="2592288" cy="1584176"/>
-          </a:xfrm>
-        </p:spPr>
-      </p:pic>
-      <p:sp>
-        <p:nvSpPr>
-          <p:cNvPr id="3" name="Plassholder for lysbildenummer 2"/>
-          <p:cNvSpPr>
-            <a:spLocks noGrp="1"/>
-          </p:cNvSpPr>
-          <p:nvPr>
-            <p:ph type="sldNum" sz="quarter" idx="4"/>
+      <p:sp>
+        <p:nvSpPr>
+          <p:cNvPr id="3" name="Content Placeholder 2"/>
+          <p:cNvSpPr>
+            <a:spLocks noGrp="1"/>
+          </p:cNvSpPr>
+          <p:nvPr>
+            <p:ph idx="1"/>
           </p:nvPr>
         </p:nvSpPr>
         <p:spPr/>
@@ -12115,9 +11971,27 @@
           <a:bodyPr/>
           <a:lstStyle/>
           <a:p>
+            <a:endParaRPr lang="nb-NO"/>
+          </a:p>
+        </p:txBody>
+      </p:sp>
+      <p:sp>
+        <p:nvSpPr>
+          <p:cNvPr id="4" name="Slide Number Placeholder 3"/>
+          <p:cNvSpPr>
+            <a:spLocks noGrp="1"/>
+          </p:cNvSpPr>
+          <p:nvPr>
+            <p:ph type="sldNum" sz="quarter" idx="12"/>
+          </p:nvPr>
+        </p:nvSpPr>
+        <p:spPr/>
+        <p:txBody>
+          <a:bodyPr/>
+          <a:lstStyle/>
+          <a:p>
             <a:fld id="{0AE548F1-6D36-4902-B57A-69A845AA9B7E}" type="slidenum">
               <a:rPr lang="nb-NO" smtClean="0"/>
-              <a:pPr/>
               <a:t>11</a:t>
             </a:fld>
             <a:endParaRPr lang="nb-NO" dirty="0"/>
@@ -12127,7 +12001,7 @@
     </p:spTree>
     <p:extLst>
       <p:ext uri="{BB962C8B-B14F-4D97-AF65-F5344CB8AC3E}">
-        <p14:creationId xmlns:p14="http://schemas.microsoft.com/office/powerpoint/2010/main" val="882927124"/>
+        <p14:creationId xmlns:p14="http://schemas.microsoft.com/office/powerpoint/2010/main" val="2367603669"/>
       </p:ext>
     </p:extLst>
   </p:cSld>
@@ -12163,7 +12037,7 @@
       </p:grpSpPr>
       <p:sp>
         <p:nvSpPr>
-          <p:cNvPr id="7" name="Tittel 6"/>
+          <p:cNvPr id="2" name="Title 1"/>
           <p:cNvSpPr>
             <a:spLocks noGrp="1"/>
           </p:cNvSpPr>
@@ -12171,19 +12045,14 @@
             <p:ph type="title"/>
           </p:nvPr>
         </p:nvSpPr>
-        <p:spPr>
-          <a:xfrm>
-            <a:off x="5436890" y="561670"/>
-            <a:ext cx="3388315" cy="276999"/>
-          </a:xfrm>
-        </p:spPr>
+        <p:spPr/>
         <p:txBody>
           <a:bodyPr/>
           <a:lstStyle/>
           <a:p>
             <a:r>
               <a:rPr lang="nb-NO" dirty="0" smtClean="0"/>
-              <a:t>TITTEL</a:t>
+              <a:t>Takk for oppmerksomheten</a:t>
             </a:r>
             <a:endParaRPr lang="nb-NO" dirty="0"/>
           </a:p>
@@ -12191,68 +12060,7 @@
       </p:sp>
       <p:sp>
         <p:nvSpPr>
-          <p:cNvPr id="8" name="Plassholder for innhold 7"/>
-          <p:cNvSpPr>
-            <a:spLocks noGrp="1"/>
-          </p:cNvSpPr>
-          <p:nvPr>
-            <p:ph idx="1"/>
-          </p:nvPr>
-        </p:nvSpPr>
-        <p:spPr/>
-        <p:txBody>
-          <a:bodyPr/>
-          <a:lstStyle/>
-          <a:p>
-            <a:pPr>
-              <a:lnSpc>
-                <a:spcPct val="140000"/>
-              </a:lnSpc>
-              <a:buFont typeface="Arial"/>
-              <a:buChar char="•"/>
-            </a:pPr>
-            <a:r>
-              <a:rPr lang="nb-NO" sz="1100" dirty="0" smtClean="0"/>
-              <a:t>Tekst</a:t>
-            </a:r>
-            <a:endParaRPr lang="nb-NO" sz="1000" dirty="0"/>
-          </a:p>
-          <a:p>
-            <a:pPr marL="0" indent="0">
-              <a:buNone/>
-            </a:pPr>
-            <a:endParaRPr lang="nb-NO" dirty="0" smtClean="0"/>
-          </a:p>
-          <a:p>
-            <a:pPr marL="408239" lvl="1" indent="0">
-              <a:buNone/>
-            </a:pPr>
-            <a:endParaRPr lang="nb-NO" dirty="0"/>
-          </a:p>
-        </p:txBody>
-      </p:sp>
-      <p:sp>
-        <p:nvSpPr>
-          <p:cNvPr id="9" name="Plassholder for tekst 8"/>
-          <p:cNvSpPr>
-            <a:spLocks noGrp="1"/>
-          </p:cNvSpPr>
-          <p:nvPr>
-            <p:ph type="body" sz="quarter" idx="13"/>
-          </p:nvPr>
-        </p:nvSpPr>
-        <p:spPr/>
-        <p:txBody>
-          <a:bodyPr/>
-          <a:lstStyle/>
-          <a:p>
-            <a:endParaRPr lang="nb-NO"/>
-          </a:p>
-        </p:txBody>
-      </p:sp>
-      <p:sp>
-        <p:nvSpPr>
-          <p:cNvPr id="2" name="Plassholder for lysbildenummer 1"/>
+          <p:cNvPr id="3" name="Slide Number Placeholder 2"/>
           <p:cNvSpPr>
             <a:spLocks noGrp="1"/>
           </p:cNvSpPr>
@@ -12274,655 +12082,10 @@
           </a:p>
         </p:txBody>
       </p:sp>
-      <p:sp>
-        <p:nvSpPr>
-          <p:cNvPr id="3" name="Picture Placeholder 2"/>
-          <p:cNvSpPr>
-            <a:spLocks noGrp="1"/>
-          </p:cNvSpPr>
-          <p:nvPr>
-            <p:ph type="pic" sz="quarter" idx="16"/>
-          </p:nvPr>
-        </p:nvSpPr>
-        <p:spPr/>
-      </p:sp>
-      <p:sp>
-        <p:nvSpPr>
-          <p:cNvPr id="4" name="Picture Placeholder 3"/>
-          <p:cNvSpPr>
-            <a:spLocks noGrp="1"/>
-          </p:cNvSpPr>
-          <p:nvPr>
-            <p:ph type="pic" sz="quarter" idx="14"/>
-          </p:nvPr>
-        </p:nvSpPr>
-        <p:spPr/>
-      </p:sp>
-      <p:sp>
-        <p:nvSpPr>
-          <p:cNvPr id="5" name="Picture Placeholder 4"/>
-          <p:cNvSpPr>
-            <a:spLocks noGrp="1"/>
-          </p:cNvSpPr>
-          <p:nvPr>
-            <p:ph type="pic" sz="quarter" idx="15"/>
-          </p:nvPr>
-        </p:nvSpPr>
-        <p:spPr/>
-      </p:sp>
     </p:spTree>
     <p:extLst>
       <p:ext uri="{BB962C8B-B14F-4D97-AF65-F5344CB8AC3E}">
-        <p14:creationId xmlns:p14="http://schemas.microsoft.com/office/powerpoint/2010/main" val="2778849069"/>
-      </p:ext>
-    </p:extLst>
-  </p:cSld>
-  <p:clrMapOvr>
-    <a:masterClrMapping/>
-  </p:clrMapOvr>
-  <p:timing>
-    <p:tnLst>
-      <p:par>
-        <p:cTn id="1" dur="indefinite" restart="never" nodeType="tmRoot"/>
-      </p:par>
-    </p:tnLst>
-  </p:timing>
-</p:sld>
-</file>
-
-<file path=ppt/slides/slide13.xml><?xml version="1.0" encoding="utf-8"?>
-<p:sld xmlns:a="http://schemas.openxmlformats.org/drawingml/2006/main" xmlns:r="http://schemas.openxmlformats.org/officeDocument/2006/relationships" xmlns:p="http://schemas.openxmlformats.org/presentationml/2006/main">
-  <p:cSld>
-    <p:spTree>
-      <p:nvGrpSpPr>
-        <p:cNvPr id="1" name=""/>
-        <p:cNvGrpSpPr/>
-        <p:nvPr/>
-      </p:nvGrpSpPr>
-      <p:grpSpPr>
-        <a:xfrm>
-          <a:off x="0" y="0"/>
-          <a:ext cx="0" cy="0"/>
-          <a:chOff x="0" y="0"/>
-          <a:chExt cx="0" cy="0"/>
-        </a:xfrm>
-      </p:grpSpPr>
-      <p:sp>
-        <p:nvSpPr>
-          <p:cNvPr id="7" name="Tittel 6"/>
-          <p:cNvSpPr>
-            <a:spLocks noGrp="1"/>
-          </p:cNvSpPr>
-          <p:nvPr>
-            <p:ph type="title"/>
-          </p:nvPr>
-        </p:nvSpPr>
-        <p:spPr>
-          <a:xfrm>
-            <a:off x="3060626" y="562873"/>
-            <a:ext cx="3388315" cy="276999"/>
-          </a:xfrm>
-        </p:spPr>
-        <p:txBody>
-          <a:bodyPr/>
-          <a:lstStyle/>
-          <a:p>
-            <a:r>
-              <a:rPr lang="nb-NO" dirty="0" smtClean="0"/>
-              <a:t>TITTEL</a:t>
-            </a:r>
-            <a:endParaRPr lang="nb-NO" dirty="0"/>
-          </a:p>
-        </p:txBody>
-      </p:sp>
-      <p:sp>
-        <p:nvSpPr>
-          <p:cNvPr id="8" name="Plassholder for innhold 7"/>
-          <p:cNvSpPr>
-            <a:spLocks noGrp="1"/>
-          </p:cNvSpPr>
-          <p:nvPr>
-            <p:ph idx="1"/>
-          </p:nvPr>
-        </p:nvSpPr>
-        <p:spPr/>
-        <p:txBody>
-          <a:bodyPr>
-            <a:normAutofit/>
-          </a:bodyPr>
-          <a:lstStyle/>
-          <a:p>
-            <a:pPr>
-              <a:lnSpc>
-                <a:spcPct val="130000"/>
-              </a:lnSpc>
-              <a:buFont typeface="Arial"/>
-              <a:buChar char="•"/>
-            </a:pPr>
-            <a:r>
-              <a:rPr lang="nb-NO" sz="1200" dirty="0" smtClean="0"/>
-              <a:t>Tekst</a:t>
-            </a:r>
-          </a:p>
-          <a:p>
-            <a:endParaRPr lang="nb-NO" sz="1200" dirty="0"/>
-          </a:p>
-        </p:txBody>
-      </p:sp>
-      <p:sp>
-        <p:nvSpPr>
-          <p:cNvPr id="9" name="Plassholder for tekst 8"/>
-          <p:cNvSpPr>
-            <a:spLocks noGrp="1"/>
-          </p:cNvSpPr>
-          <p:nvPr>
-            <p:ph type="body" sz="quarter" idx="13"/>
-          </p:nvPr>
-        </p:nvSpPr>
-        <p:spPr/>
-        <p:txBody>
-          <a:bodyPr/>
-          <a:lstStyle/>
-          <a:p>
-            <a:endParaRPr lang="nb-NO"/>
-          </a:p>
-        </p:txBody>
-      </p:sp>
-      <p:sp>
-        <p:nvSpPr>
-          <p:cNvPr id="2" name="Plassholder for lysbildenummer 1"/>
-          <p:cNvSpPr>
-            <a:spLocks noGrp="1"/>
-          </p:cNvSpPr>
-          <p:nvPr>
-            <p:ph type="sldNum" sz="quarter" idx="4"/>
-          </p:nvPr>
-        </p:nvSpPr>
-        <p:spPr/>
-        <p:txBody>
-          <a:bodyPr/>
-          <a:lstStyle/>
-          <a:p>
-            <a:fld id="{0AE548F1-6D36-4902-B57A-69A845AA9B7E}" type="slidenum">
-              <a:rPr lang="nb-NO" smtClean="0"/>
-              <a:pPr/>
-              <a:t>13</a:t>
-            </a:fld>
-            <a:endParaRPr lang="nb-NO" dirty="0"/>
-          </a:p>
-        </p:txBody>
-      </p:sp>
-      <p:sp>
-        <p:nvSpPr>
-          <p:cNvPr id="3" name="Picture Placeholder 2"/>
-          <p:cNvSpPr>
-            <a:spLocks noGrp="1"/>
-          </p:cNvSpPr>
-          <p:nvPr>
-            <p:ph type="pic" sz="quarter" idx="15"/>
-          </p:nvPr>
-        </p:nvSpPr>
-        <p:spPr/>
-      </p:sp>
-      <p:sp>
-        <p:nvSpPr>
-          <p:cNvPr id="4" name="Picture Placeholder 3"/>
-          <p:cNvSpPr>
-            <a:spLocks noGrp="1"/>
-          </p:cNvSpPr>
-          <p:nvPr>
-            <p:ph type="pic" sz="quarter" idx="14"/>
-          </p:nvPr>
-        </p:nvSpPr>
-        <p:spPr/>
-      </p:sp>
-    </p:spTree>
-    <p:extLst>
-      <p:ext uri="{BB962C8B-B14F-4D97-AF65-F5344CB8AC3E}">
-        <p14:creationId xmlns:p14="http://schemas.microsoft.com/office/powerpoint/2010/main" val="2137462261"/>
-      </p:ext>
-    </p:extLst>
-  </p:cSld>
-  <p:clrMapOvr>
-    <a:masterClrMapping/>
-  </p:clrMapOvr>
-  <p:timing>
-    <p:tnLst>
-      <p:par>
-        <p:cTn id="1" dur="indefinite" restart="never" nodeType="tmRoot"/>
-      </p:par>
-    </p:tnLst>
-  </p:timing>
-</p:sld>
-</file>
-
-<file path=ppt/slides/slide14.xml><?xml version="1.0" encoding="utf-8"?>
-<p:sld xmlns:a="http://schemas.openxmlformats.org/drawingml/2006/main" xmlns:r="http://schemas.openxmlformats.org/officeDocument/2006/relationships" xmlns:p="http://schemas.openxmlformats.org/presentationml/2006/main">
-  <p:cSld>
-    <p:spTree>
-      <p:nvGrpSpPr>
-        <p:cNvPr id="1" name=""/>
-        <p:cNvGrpSpPr/>
-        <p:nvPr/>
-      </p:nvGrpSpPr>
-      <p:grpSpPr>
-        <a:xfrm>
-          <a:off x="0" y="0"/>
-          <a:ext cx="0" cy="0"/>
-          <a:chOff x="0" y="0"/>
-          <a:chExt cx="0" cy="0"/>
-        </a:xfrm>
-      </p:grpSpPr>
-      <p:sp>
-        <p:nvSpPr>
-          <p:cNvPr id="6" name="Tittel 5"/>
-          <p:cNvSpPr>
-            <a:spLocks noGrp="1"/>
-          </p:cNvSpPr>
-          <p:nvPr>
-            <p:ph type="title"/>
-          </p:nvPr>
-        </p:nvSpPr>
-        <p:spPr>
-          <a:xfrm>
-            <a:off x="5436890" y="561670"/>
-            <a:ext cx="3388315" cy="276999"/>
-          </a:xfrm>
-        </p:spPr>
-        <p:txBody>
-          <a:bodyPr/>
-          <a:lstStyle/>
-          <a:p>
-            <a:r>
-              <a:rPr lang="nb-NO" dirty="0" smtClean="0"/>
-              <a:t>TITTEL</a:t>
-            </a:r>
-            <a:endParaRPr lang="nb-NO" dirty="0"/>
-          </a:p>
-        </p:txBody>
-      </p:sp>
-      <p:sp>
-        <p:nvSpPr>
-          <p:cNvPr id="7" name="Plassholder for innhold 6"/>
-          <p:cNvSpPr>
-            <a:spLocks noGrp="1"/>
-          </p:cNvSpPr>
-          <p:nvPr>
-            <p:ph idx="1"/>
-          </p:nvPr>
-        </p:nvSpPr>
-        <p:spPr/>
-        <p:txBody>
-          <a:bodyPr>
-            <a:normAutofit/>
-          </a:bodyPr>
-          <a:lstStyle/>
-          <a:p>
-            <a:pPr>
-              <a:lnSpc>
-                <a:spcPct val="140000"/>
-              </a:lnSpc>
-              <a:spcBef>
-                <a:spcPts val="0"/>
-              </a:spcBef>
-              <a:buFont typeface="Arial"/>
-              <a:buChar char="•"/>
-            </a:pPr>
-            <a:r>
-              <a:rPr lang="nb-NO" sz="1100" dirty="0" smtClean="0"/>
-              <a:t>Tekst</a:t>
-            </a:r>
-            <a:endParaRPr lang="en-US" sz="1100" dirty="0"/>
-          </a:p>
-        </p:txBody>
-      </p:sp>
-      <p:sp>
-        <p:nvSpPr>
-          <p:cNvPr id="8" name="Plassholder for tekst 7"/>
-          <p:cNvSpPr>
-            <a:spLocks noGrp="1"/>
-          </p:cNvSpPr>
-          <p:nvPr>
-            <p:ph type="body" sz="quarter" idx="13"/>
-          </p:nvPr>
-        </p:nvSpPr>
-        <p:spPr/>
-        <p:txBody>
-          <a:bodyPr/>
-          <a:lstStyle/>
-          <a:p>
-            <a:endParaRPr lang="nb-NO"/>
-          </a:p>
-        </p:txBody>
-      </p:sp>
-      <p:sp>
-        <p:nvSpPr>
-          <p:cNvPr id="4" name="Plassholder for lysbildenummer 3"/>
-          <p:cNvSpPr>
-            <a:spLocks noGrp="1"/>
-          </p:cNvSpPr>
-          <p:nvPr>
-            <p:ph type="sldNum" sz="quarter" idx="4"/>
-          </p:nvPr>
-        </p:nvSpPr>
-        <p:spPr/>
-        <p:txBody>
-          <a:bodyPr/>
-          <a:lstStyle/>
-          <a:p>
-            <a:fld id="{0AE548F1-6D36-4902-B57A-69A845AA9B7E}" type="slidenum">
-              <a:rPr lang="nb-NO" smtClean="0"/>
-              <a:pPr/>
-              <a:t>14</a:t>
-            </a:fld>
-            <a:endParaRPr lang="nb-NO" dirty="0"/>
-          </a:p>
-        </p:txBody>
-      </p:sp>
-      <p:sp>
-        <p:nvSpPr>
-          <p:cNvPr id="2" name="Picture Placeholder 1"/>
-          <p:cNvSpPr>
-            <a:spLocks noGrp="1"/>
-          </p:cNvSpPr>
-          <p:nvPr>
-            <p:ph type="pic" sz="quarter" idx="14"/>
-          </p:nvPr>
-        </p:nvSpPr>
-        <p:spPr/>
-      </p:sp>
-      <p:sp>
-        <p:nvSpPr>
-          <p:cNvPr id="3" name="Picture Placeholder 2"/>
-          <p:cNvSpPr>
-            <a:spLocks noGrp="1"/>
-          </p:cNvSpPr>
-          <p:nvPr>
-            <p:ph type="pic" sz="quarter" idx="15"/>
-          </p:nvPr>
-        </p:nvSpPr>
-        <p:spPr/>
-      </p:sp>
-    </p:spTree>
-    <p:extLst>
-      <p:ext uri="{BB962C8B-B14F-4D97-AF65-F5344CB8AC3E}">
-        <p14:creationId xmlns:p14="http://schemas.microsoft.com/office/powerpoint/2010/main" val="3254374000"/>
-      </p:ext>
-    </p:extLst>
-  </p:cSld>
-  <p:clrMapOvr>
-    <a:masterClrMapping/>
-  </p:clrMapOvr>
-  <p:timing>
-    <p:tnLst>
-      <p:par>
-        <p:cTn id="1" dur="indefinite" restart="never" nodeType="tmRoot"/>
-      </p:par>
-    </p:tnLst>
-  </p:timing>
-</p:sld>
-</file>
-
-<file path=ppt/slides/slide15.xml><?xml version="1.0" encoding="utf-8"?>
-<p:sld xmlns:a="http://schemas.openxmlformats.org/drawingml/2006/main" xmlns:r="http://schemas.openxmlformats.org/officeDocument/2006/relationships" xmlns:p="http://schemas.openxmlformats.org/presentationml/2006/main">
-  <p:cSld>
-    <p:spTree>
-      <p:nvGrpSpPr>
-        <p:cNvPr id="1" name=""/>
-        <p:cNvGrpSpPr/>
-        <p:nvPr/>
-      </p:nvGrpSpPr>
-      <p:grpSpPr>
-        <a:xfrm>
-          <a:off x="0" y="0"/>
-          <a:ext cx="0" cy="0"/>
-          <a:chOff x="0" y="0"/>
-          <a:chExt cx="0" cy="0"/>
-        </a:xfrm>
-      </p:grpSpPr>
-      <p:sp>
-        <p:nvSpPr>
-          <p:cNvPr id="6" name="Tittel 5"/>
-          <p:cNvSpPr>
-            <a:spLocks noGrp="1"/>
-          </p:cNvSpPr>
-          <p:nvPr>
-            <p:ph type="title"/>
-          </p:nvPr>
-        </p:nvSpPr>
-        <p:spPr>
-          <a:xfrm>
-            <a:off x="5436890" y="561670"/>
-            <a:ext cx="3388315" cy="276999"/>
-          </a:xfrm>
-        </p:spPr>
-        <p:txBody>
-          <a:bodyPr/>
-          <a:lstStyle/>
-          <a:p>
-            <a:r>
-              <a:rPr lang="nb-NO" dirty="0" smtClean="0"/>
-              <a:t>TITTEL</a:t>
-            </a:r>
-            <a:endParaRPr lang="nb-NO" dirty="0"/>
-          </a:p>
-        </p:txBody>
-      </p:sp>
-      <p:sp>
-        <p:nvSpPr>
-          <p:cNvPr id="7" name="Plassholder for innhold 6"/>
-          <p:cNvSpPr>
-            <a:spLocks noGrp="1"/>
-          </p:cNvSpPr>
-          <p:nvPr>
-            <p:ph idx="1"/>
-          </p:nvPr>
-        </p:nvSpPr>
-        <p:spPr>
-          <a:xfrm>
-            <a:off x="5436948" y="1276400"/>
-            <a:ext cx="3600342" cy="3868688"/>
-          </a:xfrm>
-        </p:spPr>
-        <p:txBody>
-          <a:bodyPr>
-            <a:normAutofit/>
-          </a:bodyPr>
-          <a:lstStyle/>
-          <a:p>
-            <a:pPr>
-              <a:lnSpc>
-                <a:spcPct val="140000"/>
-              </a:lnSpc>
-              <a:spcBef>
-                <a:spcPts val="0"/>
-              </a:spcBef>
-              <a:buFont typeface="Arial"/>
-              <a:buChar char="•"/>
-            </a:pPr>
-            <a:r>
-              <a:rPr lang="nb-NO" sz="1100" dirty="0" smtClean="0"/>
-              <a:t>Tekst</a:t>
-            </a:r>
-            <a:endParaRPr lang="nb-NO" sz="1100" b="1" dirty="0" smtClean="0"/>
-          </a:p>
-          <a:p>
-            <a:pPr marL="0" indent="0">
-              <a:spcBef>
-                <a:spcPts val="0"/>
-              </a:spcBef>
-              <a:buNone/>
-              <a:tabLst>
-                <a:tab pos="180975" algn="l"/>
-              </a:tabLst>
-            </a:pPr>
-            <a:endParaRPr lang="nb-NO" sz="1200" dirty="0"/>
-          </a:p>
-        </p:txBody>
-      </p:sp>
-      <p:sp>
-        <p:nvSpPr>
-          <p:cNvPr id="8" name="Plassholder for tekst 7"/>
-          <p:cNvSpPr>
-            <a:spLocks noGrp="1"/>
-          </p:cNvSpPr>
-          <p:nvPr>
-            <p:ph type="body" sz="quarter" idx="13"/>
-          </p:nvPr>
-        </p:nvSpPr>
-        <p:spPr/>
-        <p:txBody>
-          <a:bodyPr/>
-          <a:lstStyle/>
-          <a:p>
-            <a:endParaRPr lang="nb-NO"/>
-          </a:p>
-        </p:txBody>
-      </p:sp>
-      <p:sp>
-        <p:nvSpPr>
-          <p:cNvPr id="3" name="Plassholder for lysbildenummer 2"/>
-          <p:cNvSpPr>
-            <a:spLocks noGrp="1"/>
-          </p:cNvSpPr>
-          <p:nvPr>
-            <p:ph type="sldNum" sz="quarter" idx="4"/>
-          </p:nvPr>
-        </p:nvSpPr>
-        <p:spPr/>
-        <p:txBody>
-          <a:bodyPr/>
-          <a:lstStyle/>
-          <a:p>
-            <a:fld id="{0AE548F1-6D36-4902-B57A-69A845AA9B7E}" type="slidenum">
-              <a:rPr lang="nb-NO" smtClean="0"/>
-              <a:pPr/>
-              <a:t>15</a:t>
-            </a:fld>
-            <a:endParaRPr lang="nb-NO" dirty="0"/>
-          </a:p>
-        </p:txBody>
-      </p:sp>
-      <p:sp>
-        <p:nvSpPr>
-          <p:cNvPr id="2" name="Picture Placeholder 1"/>
-          <p:cNvSpPr>
-            <a:spLocks noGrp="1"/>
-          </p:cNvSpPr>
-          <p:nvPr>
-            <p:ph type="pic" sz="quarter" idx="14"/>
-          </p:nvPr>
-        </p:nvSpPr>
-        <p:spPr/>
-      </p:sp>
-    </p:spTree>
-    <p:extLst>
-      <p:ext uri="{BB962C8B-B14F-4D97-AF65-F5344CB8AC3E}">
-        <p14:creationId xmlns:p14="http://schemas.microsoft.com/office/powerpoint/2010/main" val="80591050"/>
-      </p:ext>
-    </p:extLst>
-  </p:cSld>
-  <p:clrMapOvr>
-    <a:masterClrMapping/>
-  </p:clrMapOvr>
-  <p:timing>
-    <p:tnLst>
-      <p:par>
-        <p:cTn id="1" dur="indefinite" restart="never" nodeType="tmRoot"/>
-      </p:par>
-    </p:tnLst>
-  </p:timing>
-</p:sld>
-</file>
-
-<file path=ppt/slides/slide16.xml><?xml version="1.0" encoding="utf-8"?>
-<p:sld xmlns:a="http://schemas.openxmlformats.org/drawingml/2006/main" xmlns:r="http://schemas.openxmlformats.org/officeDocument/2006/relationships" xmlns:p="http://schemas.openxmlformats.org/presentationml/2006/main">
-  <p:cSld>
-    <p:bg>
-      <p:bgPr>
-        <a:blipFill dpi="0" rotWithShape="1">
-          <a:blip r:embed="rId2">
-            <a:alphaModFix amt="0"/>
-            <a:lum/>
-          </a:blip>
-          <a:srcRect/>
-          <a:stretch>
-            <a:fillRect/>
-          </a:stretch>
-        </a:blipFill>
-        <a:effectLst/>
-      </p:bgPr>
-    </p:bg>
-    <p:spTree>
-      <p:nvGrpSpPr>
-        <p:cNvPr id="1" name=""/>
-        <p:cNvGrpSpPr/>
-        <p:nvPr/>
-      </p:nvGrpSpPr>
-      <p:grpSpPr>
-        <a:xfrm>
-          <a:off x="0" y="0"/>
-          <a:ext cx="0" cy="0"/>
-          <a:chOff x="0" y="0"/>
-          <a:chExt cx="0" cy="0"/>
-        </a:xfrm>
-      </p:grpSpPr>
-      <p:sp>
-        <p:nvSpPr>
-          <p:cNvPr id="7" name="Tittel 6"/>
-          <p:cNvSpPr>
-            <a:spLocks noGrp="1"/>
-          </p:cNvSpPr>
-          <p:nvPr>
-            <p:ph type="title"/>
-          </p:nvPr>
-        </p:nvSpPr>
-        <p:spPr>
-          <a:xfrm>
-            <a:off x="392391" y="1780456"/>
-            <a:ext cx="8231029" cy="307777"/>
-          </a:xfrm>
-        </p:spPr>
-        <p:txBody>
-          <a:bodyPr/>
-          <a:lstStyle/>
-          <a:p>
-            <a:r>
-              <a:rPr lang="nb-NO" sz="2000" dirty="0" smtClean="0"/>
-              <a:t>Takk for oppmerksomheten!</a:t>
-            </a:r>
-            <a:endParaRPr lang="nb-NO" sz="2000" dirty="0"/>
-          </a:p>
-        </p:txBody>
-      </p:sp>
-      <p:sp>
-        <p:nvSpPr>
-          <p:cNvPr id="2" name="Plassholder for lysbildenummer 1"/>
-          <p:cNvSpPr>
-            <a:spLocks noGrp="1"/>
-          </p:cNvSpPr>
-          <p:nvPr>
-            <p:ph type="sldNum" sz="quarter" idx="4"/>
-          </p:nvPr>
-        </p:nvSpPr>
-        <p:spPr/>
-        <p:txBody>
-          <a:bodyPr/>
-          <a:lstStyle/>
-          <a:p>
-            <a:fld id="{0AE548F1-6D36-4902-B57A-69A845AA9B7E}" type="slidenum">
-              <a:rPr lang="nb-NO" smtClean="0"/>
-              <a:pPr/>
-              <a:t>16</a:t>
-            </a:fld>
-            <a:endParaRPr lang="nb-NO" dirty="0"/>
-          </a:p>
-        </p:txBody>
-      </p:sp>
-    </p:spTree>
-    <p:extLst>
-      <p:ext uri="{BB962C8B-B14F-4D97-AF65-F5344CB8AC3E}">
-        <p14:creationId xmlns:p14="http://schemas.microsoft.com/office/powerpoint/2010/main" val="2269148305"/>
+        <p14:creationId xmlns:p14="http://schemas.microsoft.com/office/powerpoint/2010/main" val="251739541"/>
       </p:ext>
     </p:extLst>
   </p:cSld>
@@ -12942,20 +12105,6 @@
 <file path=ppt/slides/slide2.xml><?xml version="1.0" encoding="utf-8"?>
 <p:sld xmlns:a="http://schemas.openxmlformats.org/drawingml/2006/main" xmlns:r="http://schemas.openxmlformats.org/officeDocument/2006/relationships" xmlns:p="http://schemas.openxmlformats.org/presentationml/2006/main">
   <p:cSld>
-    <p:bg>
-      <p:bgPr>
-        <a:blipFill dpi="0" rotWithShape="1">
-          <a:blip r:embed="rId2">
-            <a:lum/>
-          </a:blip>
-          <a:srcRect/>
-          <a:stretch>
-            <a:fillRect/>
-          </a:stretch>
-        </a:blipFill>
-        <a:effectLst/>
-      </p:bgPr>
-    </p:bg>
     <p:spTree>
       <p:nvGrpSpPr>
         <p:cNvPr id="1" name=""/>
@@ -12970,17 +12119,158 @@
           <a:chExt cx="0" cy="0"/>
         </a:xfrm>
       </p:grpSpPr>
+      <p:sp>
+        <p:nvSpPr>
+          <p:cNvPr id="2" name="Title 1"/>
+          <p:cNvSpPr>
+            <a:spLocks noGrp="1"/>
+          </p:cNvSpPr>
+          <p:nvPr>
+            <p:ph type="title"/>
+          </p:nvPr>
+        </p:nvSpPr>
+        <p:spPr>
+          <a:xfrm>
+            <a:off x="392391" y="561670"/>
+            <a:ext cx="3388315" cy="276999"/>
+          </a:xfrm>
+        </p:spPr>
+        <p:txBody>
+          <a:bodyPr/>
+          <a:lstStyle/>
+          <a:p>
+            <a:r>
+              <a:rPr lang="nb-NO" dirty="0" smtClean="0"/>
+              <a:t>Agenda</a:t>
+            </a:r>
+            <a:endParaRPr lang="nb-NO" dirty="0"/>
+          </a:p>
+        </p:txBody>
+      </p:sp>
+      <p:sp>
+        <p:nvSpPr>
+          <p:cNvPr id="3" name="Content Placeholder 2"/>
+          <p:cNvSpPr>
+            <a:spLocks noGrp="1"/>
+          </p:cNvSpPr>
+          <p:nvPr>
+            <p:ph idx="1"/>
+          </p:nvPr>
+        </p:nvSpPr>
+        <p:spPr/>
+        <p:txBody>
+          <a:bodyPr>
+            <a:normAutofit/>
+          </a:bodyPr>
+          <a:lstStyle/>
+          <a:p>
+            <a:r>
+              <a:rPr lang="nb-NO" sz="1600" dirty="0" smtClean="0"/>
+              <a:t>Om Computas AS</a:t>
+            </a:r>
+          </a:p>
+          <a:p>
+            <a:r>
+              <a:rPr lang="nb-NO" sz="1600" dirty="0" smtClean="0"/>
+              <a:t>Om oss</a:t>
+            </a:r>
+          </a:p>
+          <a:p>
+            <a:r>
+              <a:rPr lang="nb-NO" sz="1600" dirty="0" smtClean="0"/>
+              <a:t>Semantisk web kurs:</a:t>
+            </a:r>
+          </a:p>
+          <a:p>
+            <a:pPr lvl="1"/>
+            <a:r>
+              <a:rPr lang="nb-NO" sz="1600" dirty="0" smtClean="0"/>
+              <a:t>Litt teori</a:t>
+            </a:r>
+          </a:p>
+          <a:p>
+            <a:pPr lvl="1"/>
+            <a:r>
+              <a:rPr lang="nb-NO" sz="1600" dirty="0" smtClean="0"/>
+              <a:t>Interaktivt bygge modell</a:t>
+            </a:r>
+          </a:p>
+          <a:p>
+            <a:pPr lvl="1"/>
+            <a:r>
+              <a:rPr lang="nb-NO" sz="1600" dirty="0" smtClean="0"/>
+              <a:t>Generere data</a:t>
+            </a:r>
+          </a:p>
+          <a:p>
+            <a:pPr lvl="1"/>
+            <a:r>
+              <a:rPr lang="nb-NO" sz="1600" dirty="0" smtClean="0"/>
+              <a:t>Spørringer (SPARQL)</a:t>
+            </a:r>
+          </a:p>
+          <a:p>
+            <a:r>
+              <a:rPr lang="nb-NO" sz="1600" dirty="0" smtClean="0"/>
+              <a:t>Sosialt </a:t>
+            </a:r>
+          </a:p>
+        </p:txBody>
+      </p:sp>
+      <p:sp>
+        <p:nvSpPr>
+          <p:cNvPr id="5" name="Text Placeholder 4"/>
+          <p:cNvSpPr>
+            <a:spLocks noGrp="1"/>
+          </p:cNvSpPr>
+          <p:nvPr>
+            <p:ph type="body" sz="quarter" idx="13"/>
+          </p:nvPr>
+        </p:nvSpPr>
+        <p:spPr/>
+        <p:txBody>
+          <a:bodyPr/>
+          <a:lstStyle/>
+          <a:p>
+            <a:endParaRPr lang="nb-NO" dirty="0"/>
+          </a:p>
+        </p:txBody>
+      </p:sp>
+      <p:sp>
+        <p:nvSpPr>
+          <p:cNvPr id="6" name="Slide Number Placeholder 5"/>
+          <p:cNvSpPr>
+            <a:spLocks noGrp="1"/>
+          </p:cNvSpPr>
+          <p:nvPr>
+            <p:ph type="sldNum" sz="quarter" idx="4"/>
+          </p:nvPr>
+        </p:nvSpPr>
+        <p:spPr/>
+        <p:txBody>
+          <a:bodyPr/>
+          <a:lstStyle/>
+          <a:p>
+            <a:fld id="{0AE548F1-6D36-4902-B57A-69A845AA9B7E}" type="slidenum">
+              <a:rPr lang="nb-NO" smtClean="0"/>
+              <a:pPr/>
+              <a:t>2</a:t>
+            </a:fld>
+            <a:endParaRPr lang="nb-NO" dirty="0"/>
+          </a:p>
+        </p:txBody>
+      </p:sp>
       <p:pic>
         <p:nvPicPr>
-          <p:cNvPr id="2" name="Plassholder for bilde 1"/>
+          <p:cNvPr id="20" name="Picture Placeholder 19"/>
           <p:cNvPicPr>
             <a:picLocks noGrp="1" noChangeAspect="1"/>
           </p:cNvPicPr>
           <p:nvPr>
-            <p:ph type="pic" sz="quarter" idx="10"/>
+            <p:ph type="pic" sz="quarter" idx="14"/>
           </p:nvPr>
         </p:nvPicPr>
-        <p:blipFill rotWithShape="1">
+        <p:blipFill>
           <a:blip r:embed="rId3">
             <a:extLst>
               <a:ext uri="{28A0092B-C50C-407E-A947-70E740481C1C}">
@@ -12988,206 +12278,17 @@
               </a:ext>
             </a:extLst>
           </a:blip>
-          <a:srcRect l="-3508" r="-4917"/>
-          <a:stretch/>
+          <a:srcRect l="16629" r="16629"/>
+          <a:stretch>
+            <a:fillRect/>
+          </a:stretch>
         </p:blipFill>
-        <p:spPr>
-          <a:xfrm>
-            <a:off x="1116410" y="1826176"/>
-            <a:ext cx="1512168" cy="1223962"/>
-          </a:xfrm>
-          <a:effectLst>
-            <a:outerShdw blurRad="698500" dist="38100" dir="5400000" algn="ctr" rotWithShape="0">
-              <a:srgbClr val="000000">
-                <a:alpha val="43137"/>
-              </a:srgbClr>
-            </a:outerShdw>
-          </a:effectLst>
-        </p:spPr>
-      </p:pic>
-      <p:pic>
-        <p:nvPicPr>
-          <p:cNvPr id="3" name="Plassholder for bilde 2"/>
-          <p:cNvPicPr>
-            <a:picLocks noGrp="1" noChangeAspect="1"/>
-          </p:cNvPicPr>
-          <p:nvPr>
-            <p:ph type="pic" sz="quarter" idx="11"/>
-          </p:nvPr>
-        </p:nvPicPr>
-        <p:blipFill rotWithShape="1">
-          <a:blip r:embed="rId4">
-            <a:extLst>
-              <a:ext uri="{28A0092B-C50C-407E-A947-70E740481C1C}">
-                <a14:useLocalDpi xmlns:a14="http://schemas.microsoft.com/office/drawing/2010/main" val="0"/>
-              </a:ext>
-            </a:extLst>
-          </a:blip>
-          <a:srcRect l="-5680" r="-3861"/>
-          <a:stretch/>
-        </p:blipFill>
-        <p:spPr>
-          <a:xfrm>
-            <a:off x="6249084" y="1806472"/>
-            <a:ext cx="2160240" cy="1223962"/>
-          </a:xfrm>
-          <a:effectLst>
-            <a:outerShdw blurRad="1270000" dist="50800" dir="21540000" algn="ctr" rotWithShape="0">
-              <a:srgbClr val="000000">
-                <a:alpha val="43137"/>
-              </a:srgbClr>
-            </a:outerShdw>
-          </a:effectLst>
-        </p:spPr>
-      </p:pic>
-      <p:sp>
-        <p:nvSpPr>
-          <p:cNvPr id="13" name="Plassholder for tekst 12"/>
-          <p:cNvSpPr>
-            <a:spLocks noGrp="1"/>
-          </p:cNvSpPr>
-          <p:nvPr>
-            <p:ph type="body" sz="quarter" idx="13"/>
-          </p:nvPr>
-        </p:nvSpPr>
-        <p:spPr>
-          <a:xfrm>
-            <a:off x="635950" y="3443057"/>
-            <a:ext cx="2448272" cy="305661"/>
-          </a:xfrm>
-        </p:spPr>
-        <p:txBody>
-          <a:bodyPr/>
-          <a:lstStyle/>
-          <a:p>
-            <a:r>
-              <a:rPr lang="nb-NO" dirty="0" smtClean="0"/>
-              <a:t>SWP GENERELT</a:t>
-            </a:r>
-            <a:endParaRPr lang="nb-NO" dirty="0"/>
-          </a:p>
-        </p:txBody>
-      </p:sp>
-      <p:sp>
-        <p:nvSpPr>
-          <p:cNvPr id="14" name="Plassholder for tekst 13"/>
-          <p:cNvSpPr>
-            <a:spLocks noGrp="1"/>
-          </p:cNvSpPr>
-          <p:nvPr>
-            <p:ph type="body" sz="quarter" idx="14"/>
-          </p:nvPr>
-        </p:nvSpPr>
-        <p:spPr>
-          <a:xfrm>
-            <a:off x="3348658" y="3442030"/>
-            <a:ext cx="2448272" cy="305661"/>
-          </a:xfrm>
-        </p:spPr>
-        <p:txBody>
-          <a:bodyPr/>
-          <a:lstStyle/>
-          <a:p>
-            <a:r>
-              <a:rPr lang="nb-NO" dirty="0" smtClean="0"/>
-              <a:t>SWP Avansert</a:t>
-            </a:r>
-            <a:endParaRPr lang="nb-NO" dirty="0"/>
-          </a:p>
-        </p:txBody>
-      </p:sp>
-      <p:sp>
-        <p:nvSpPr>
-          <p:cNvPr id="15" name="Plassholder for tekst 14"/>
-          <p:cNvSpPr>
-            <a:spLocks noGrp="1"/>
-          </p:cNvSpPr>
-          <p:nvPr>
-            <p:ph type="body" sz="quarter" idx="15"/>
-          </p:nvPr>
-        </p:nvSpPr>
-        <p:spPr>
-          <a:xfrm>
-            <a:off x="6105068" y="3442030"/>
-            <a:ext cx="2448272" cy="305661"/>
-          </a:xfrm>
-        </p:spPr>
-        <p:txBody>
-          <a:bodyPr/>
-          <a:lstStyle/>
-          <a:p>
-            <a:r>
-              <a:rPr lang="nb-NO" dirty="0" smtClean="0"/>
-              <a:t>EKSAMEN</a:t>
-            </a:r>
-            <a:endParaRPr lang="nb-NO" dirty="0"/>
-          </a:p>
-        </p:txBody>
-      </p:sp>
-      <p:sp>
-        <p:nvSpPr>
-          <p:cNvPr id="6" name="Plassholder for lysbildenummer 5"/>
-          <p:cNvSpPr>
-            <a:spLocks noGrp="1"/>
-          </p:cNvSpPr>
-          <p:nvPr>
-            <p:ph type="sldNum" sz="quarter" idx="4"/>
-          </p:nvPr>
-        </p:nvSpPr>
         <p:spPr/>
-        <p:txBody>
-          <a:bodyPr/>
-          <a:lstStyle/>
-          <a:p>
-            <a:fld id="{0AE548F1-6D36-4902-B57A-69A845AA9B7E}" type="slidenum">
-              <a:rPr lang="nb-NO" smtClean="0"/>
-              <a:pPr/>
-              <a:t>2</a:t>
-            </a:fld>
-            <a:endParaRPr lang="nb-NO" dirty="0"/>
-          </a:p>
-        </p:txBody>
-      </p:sp>
-      <p:pic>
-        <p:nvPicPr>
-          <p:cNvPr id="10" name="Plassholder for bilde 3"/>
-          <p:cNvPicPr>
-            <a:picLocks noChangeAspect="1"/>
-          </p:cNvPicPr>
-          <p:nvPr/>
-        </p:nvPicPr>
-        <p:blipFill rotWithShape="1">
-          <a:blip r:embed="rId5">
-            <a:extLst>
-              <a:ext uri="{28A0092B-C50C-407E-A947-70E740481C1C}">
-                <a14:useLocalDpi xmlns:a14="http://schemas.microsoft.com/office/drawing/2010/main" val="0"/>
-              </a:ext>
-            </a:extLst>
-          </a:blip>
-          <a:srcRect l="-6771" r="-4573"/>
-          <a:stretch/>
-        </p:blipFill>
-        <p:spPr>
-          <a:xfrm>
-            <a:off x="3672694" y="1789020"/>
-            <a:ext cx="1800200" cy="1223962"/>
-          </a:xfrm>
-          <a:prstGeom prst="rect">
-            <a:avLst/>
-          </a:prstGeom>
-          <a:effectLst>
-            <a:outerShdw blurRad="1270000" dist="50800" dir="21540000" algn="ctr" rotWithShape="0">
-              <a:srgbClr val="000000">
-                <a:alpha val="48000"/>
-              </a:srgbClr>
-            </a:outerShdw>
-          </a:effectLst>
-        </p:spPr>
       </p:pic>
     </p:spTree>
     <p:extLst>
       <p:ext uri="{BB962C8B-B14F-4D97-AF65-F5344CB8AC3E}">
-        <p14:creationId xmlns:p14="http://schemas.microsoft.com/office/powerpoint/2010/main" val="2994908531"/>
+        <p14:creationId xmlns:p14="http://schemas.microsoft.com/office/powerpoint/2010/main" val="3323857869"/>
       </p:ext>
     </p:extLst>
   </p:cSld>
@@ -13197,9 +12298,427 @@
   <p:timing>
     <p:tnLst>
       <p:par>
-        <p:cTn id="1" dur="indefinite" restart="never" nodeType="tmRoot"/>
+        <p:cTn id="1" dur="indefinite" restart="never" nodeType="tmRoot">
+          <p:childTnLst>
+            <p:seq concurrent="1" nextAc="seek">
+              <p:cTn id="2" dur="indefinite" nodeType="mainSeq">
+                <p:childTnLst>
+                  <p:par>
+                    <p:cTn id="3" fill="hold">
+                      <p:stCondLst>
+                        <p:cond delay="indefinite"/>
+                      </p:stCondLst>
+                      <p:childTnLst>
+                        <p:par>
+                          <p:cTn id="4" fill="hold">
+                            <p:stCondLst>
+                              <p:cond delay="0"/>
+                            </p:stCondLst>
+                            <p:childTnLst>
+                              <p:par>
+                                <p:cTn id="5" presetID="1" presetClass="entr" presetSubtype="0" fill="hold" grpId="0" nodeType="clickEffect">
+                                  <p:stCondLst>
+                                    <p:cond delay="0"/>
+                                  </p:stCondLst>
+                                  <p:childTnLst>
+                                    <p:set>
+                                      <p:cBhvr>
+                                        <p:cTn id="6" dur="1" fill="hold">
+                                          <p:stCondLst>
+                                            <p:cond delay="0"/>
+                                          </p:stCondLst>
+                                        </p:cTn>
+                                        <p:tgtEl>
+                                          <p:spTgt spid="3">
+                                            <p:txEl>
+                                              <p:pRg st="0" end="0"/>
+                                            </p:txEl>
+                                          </p:spTgt>
+                                        </p:tgtEl>
+                                        <p:attrNameLst>
+                                          <p:attrName>style.visibility</p:attrName>
+                                        </p:attrNameLst>
+                                      </p:cBhvr>
+                                      <p:to>
+                                        <p:strVal val="visible"/>
+                                      </p:to>
+                                    </p:set>
+                                  </p:childTnLst>
+                                </p:cTn>
+                              </p:par>
+                            </p:childTnLst>
+                          </p:cTn>
+                        </p:par>
+                      </p:childTnLst>
+                    </p:cTn>
+                  </p:par>
+                  <p:par>
+                    <p:cTn id="7" fill="hold">
+                      <p:stCondLst>
+                        <p:cond delay="indefinite"/>
+                      </p:stCondLst>
+                      <p:childTnLst>
+                        <p:par>
+                          <p:cTn id="8" fill="hold">
+                            <p:stCondLst>
+                              <p:cond delay="0"/>
+                            </p:stCondLst>
+                            <p:childTnLst>
+                              <p:par>
+                                <p:cTn id="9" presetID="1" presetClass="entr" presetSubtype="0" fill="hold" grpId="0" nodeType="clickEffect">
+                                  <p:stCondLst>
+                                    <p:cond delay="0"/>
+                                  </p:stCondLst>
+                                  <p:childTnLst>
+                                    <p:set>
+                                      <p:cBhvr>
+                                        <p:cTn id="10" dur="1" fill="hold">
+                                          <p:stCondLst>
+                                            <p:cond delay="0"/>
+                                          </p:stCondLst>
+                                        </p:cTn>
+                                        <p:tgtEl>
+                                          <p:spTgt spid="3">
+                                            <p:txEl>
+                                              <p:pRg st="1" end="1"/>
+                                            </p:txEl>
+                                          </p:spTgt>
+                                        </p:tgtEl>
+                                        <p:attrNameLst>
+                                          <p:attrName>style.visibility</p:attrName>
+                                        </p:attrNameLst>
+                                      </p:cBhvr>
+                                      <p:to>
+                                        <p:strVal val="visible"/>
+                                      </p:to>
+                                    </p:set>
+                                  </p:childTnLst>
+                                </p:cTn>
+                              </p:par>
+                            </p:childTnLst>
+                          </p:cTn>
+                        </p:par>
+                      </p:childTnLst>
+                    </p:cTn>
+                  </p:par>
+                  <p:par>
+                    <p:cTn id="11" fill="hold">
+                      <p:stCondLst>
+                        <p:cond delay="indefinite"/>
+                      </p:stCondLst>
+                      <p:childTnLst>
+                        <p:par>
+                          <p:cTn id="12" fill="hold">
+                            <p:stCondLst>
+                              <p:cond delay="0"/>
+                            </p:stCondLst>
+                            <p:childTnLst>
+                              <p:par>
+                                <p:cTn id="13" presetID="1" presetClass="entr" presetSubtype="0" fill="hold" grpId="0" nodeType="clickEffect">
+                                  <p:stCondLst>
+                                    <p:cond delay="0"/>
+                                  </p:stCondLst>
+                                  <p:childTnLst>
+                                    <p:set>
+                                      <p:cBhvr>
+                                        <p:cTn id="14" dur="1" fill="hold">
+                                          <p:stCondLst>
+                                            <p:cond delay="0"/>
+                                          </p:stCondLst>
+                                        </p:cTn>
+                                        <p:tgtEl>
+                                          <p:spTgt spid="3">
+                                            <p:txEl>
+                                              <p:pRg st="2" end="2"/>
+                                            </p:txEl>
+                                          </p:spTgt>
+                                        </p:tgtEl>
+                                        <p:attrNameLst>
+                                          <p:attrName>style.visibility</p:attrName>
+                                        </p:attrNameLst>
+                                      </p:cBhvr>
+                                      <p:to>
+                                        <p:strVal val="visible"/>
+                                      </p:to>
+                                    </p:set>
+                                  </p:childTnLst>
+                                </p:cTn>
+                              </p:par>
+                            </p:childTnLst>
+                          </p:cTn>
+                        </p:par>
+                      </p:childTnLst>
+                    </p:cTn>
+                  </p:par>
+                  <p:par>
+                    <p:cTn id="15" fill="hold">
+                      <p:stCondLst>
+                        <p:cond delay="indefinite"/>
+                      </p:stCondLst>
+                      <p:childTnLst>
+                        <p:par>
+                          <p:cTn id="16" fill="hold">
+                            <p:stCondLst>
+                              <p:cond delay="0"/>
+                            </p:stCondLst>
+                            <p:childTnLst>
+                              <p:par>
+                                <p:cTn id="17" presetID="1" presetClass="entr" presetSubtype="0" fill="hold" grpId="0" nodeType="clickEffect">
+                                  <p:stCondLst>
+                                    <p:cond delay="0"/>
+                                  </p:stCondLst>
+                                  <p:childTnLst>
+                                    <p:set>
+                                      <p:cBhvr>
+                                        <p:cTn id="18" dur="1" fill="hold">
+                                          <p:stCondLst>
+                                            <p:cond delay="0"/>
+                                          </p:stCondLst>
+                                        </p:cTn>
+                                        <p:tgtEl>
+                                          <p:spTgt spid="3">
+                                            <p:txEl>
+                                              <p:pRg st="3" end="3"/>
+                                            </p:txEl>
+                                          </p:spTgt>
+                                        </p:tgtEl>
+                                        <p:attrNameLst>
+                                          <p:attrName>style.visibility</p:attrName>
+                                        </p:attrNameLst>
+                                      </p:cBhvr>
+                                      <p:to>
+                                        <p:strVal val="visible"/>
+                                      </p:to>
+                                    </p:set>
+                                  </p:childTnLst>
+                                </p:cTn>
+                              </p:par>
+                            </p:childTnLst>
+                          </p:cTn>
+                        </p:par>
+                      </p:childTnLst>
+                    </p:cTn>
+                  </p:par>
+                  <p:par>
+                    <p:cTn id="19" fill="hold">
+                      <p:stCondLst>
+                        <p:cond delay="indefinite"/>
+                      </p:stCondLst>
+                      <p:childTnLst>
+                        <p:par>
+                          <p:cTn id="20" fill="hold">
+                            <p:stCondLst>
+                              <p:cond delay="0"/>
+                            </p:stCondLst>
+                            <p:childTnLst>
+                              <p:par>
+                                <p:cTn id="21" presetID="1" presetClass="entr" presetSubtype="0" fill="hold" grpId="0" nodeType="clickEffect">
+                                  <p:stCondLst>
+                                    <p:cond delay="0"/>
+                                  </p:stCondLst>
+                                  <p:childTnLst>
+                                    <p:set>
+                                      <p:cBhvr>
+                                        <p:cTn id="22" dur="1" fill="hold">
+                                          <p:stCondLst>
+                                            <p:cond delay="0"/>
+                                          </p:stCondLst>
+                                        </p:cTn>
+                                        <p:tgtEl>
+                                          <p:spTgt spid="3">
+                                            <p:txEl>
+                                              <p:pRg st="4" end="4"/>
+                                            </p:txEl>
+                                          </p:spTgt>
+                                        </p:tgtEl>
+                                        <p:attrNameLst>
+                                          <p:attrName>style.visibility</p:attrName>
+                                        </p:attrNameLst>
+                                      </p:cBhvr>
+                                      <p:to>
+                                        <p:strVal val="visible"/>
+                                      </p:to>
+                                    </p:set>
+                                  </p:childTnLst>
+                                </p:cTn>
+                              </p:par>
+                            </p:childTnLst>
+                          </p:cTn>
+                        </p:par>
+                      </p:childTnLst>
+                    </p:cTn>
+                  </p:par>
+                  <p:par>
+                    <p:cTn id="23" fill="hold">
+                      <p:stCondLst>
+                        <p:cond delay="indefinite"/>
+                      </p:stCondLst>
+                      <p:childTnLst>
+                        <p:par>
+                          <p:cTn id="24" fill="hold">
+                            <p:stCondLst>
+                              <p:cond delay="0"/>
+                            </p:stCondLst>
+                            <p:childTnLst>
+                              <p:par>
+                                <p:cTn id="25" presetID="1" presetClass="entr" presetSubtype="0" fill="hold" grpId="0" nodeType="clickEffect">
+                                  <p:stCondLst>
+                                    <p:cond delay="0"/>
+                                  </p:stCondLst>
+                                  <p:childTnLst>
+                                    <p:set>
+                                      <p:cBhvr>
+                                        <p:cTn id="26" dur="1" fill="hold">
+                                          <p:stCondLst>
+                                            <p:cond delay="0"/>
+                                          </p:stCondLst>
+                                        </p:cTn>
+                                        <p:tgtEl>
+                                          <p:spTgt spid="3">
+                                            <p:txEl>
+                                              <p:pRg st="5" end="5"/>
+                                            </p:txEl>
+                                          </p:spTgt>
+                                        </p:tgtEl>
+                                        <p:attrNameLst>
+                                          <p:attrName>style.visibility</p:attrName>
+                                        </p:attrNameLst>
+                                      </p:cBhvr>
+                                      <p:to>
+                                        <p:strVal val="visible"/>
+                                      </p:to>
+                                    </p:set>
+                                  </p:childTnLst>
+                                </p:cTn>
+                              </p:par>
+                            </p:childTnLst>
+                          </p:cTn>
+                        </p:par>
+                      </p:childTnLst>
+                    </p:cTn>
+                  </p:par>
+                  <p:par>
+                    <p:cTn id="27" fill="hold">
+                      <p:stCondLst>
+                        <p:cond delay="indefinite"/>
+                      </p:stCondLst>
+                      <p:childTnLst>
+                        <p:par>
+                          <p:cTn id="28" fill="hold">
+                            <p:stCondLst>
+                              <p:cond delay="0"/>
+                            </p:stCondLst>
+                            <p:childTnLst>
+                              <p:par>
+                                <p:cTn id="29" presetID="1" presetClass="entr" presetSubtype="0" fill="hold" grpId="0" nodeType="clickEffect">
+                                  <p:stCondLst>
+                                    <p:cond delay="0"/>
+                                  </p:stCondLst>
+                                  <p:childTnLst>
+                                    <p:set>
+                                      <p:cBhvr>
+                                        <p:cTn id="30" dur="1" fill="hold">
+                                          <p:stCondLst>
+                                            <p:cond delay="0"/>
+                                          </p:stCondLst>
+                                        </p:cTn>
+                                        <p:tgtEl>
+                                          <p:spTgt spid="3">
+                                            <p:txEl>
+                                              <p:pRg st="6" end="6"/>
+                                            </p:txEl>
+                                          </p:spTgt>
+                                        </p:tgtEl>
+                                        <p:attrNameLst>
+                                          <p:attrName>style.visibility</p:attrName>
+                                        </p:attrNameLst>
+                                      </p:cBhvr>
+                                      <p:to>
+                                        <p:strVal val="visible"/>
+                                      </p:to>
+                                    </p:set>
+                                  </p:childTnLst>
+                                </p:cTn>
+                              </p:par>
+                            </p:childTnLst>
+                          </p:cTn>
+                        </p:par>
+                      </p:childTnLst>
+                    </p:cTn>
+                  </p:par>
+                  <p:par>
+                    <p:cTn id="31" fill="hold">
+                      <p:stCondLst>
+                        <p:cond delay="indefinite"/>
+                      </p:stCondLst>
+                      <p:childTnLst>
+                        <p:par>
+                          <p:cTn id="32" fill="hold">
+                            <p:stCondLst>
+                              <p:cond delay="0"/>
+                            </p:stCondLst>
+                            <p:childTnLst>
+                              <p:par>
+                                <p:cTn id="33" presetID="1" presetClass="entr" presetSubtype="0" fill="hold" grpId="0" nodeType="clickEffect">
+                                  <p:stCondLst>
+                                    <p:cond delay="0"/>
+                                  </p:stCondLst>
+                                  <p:childTnLst>
+                                    <p:set>
+                                      <p:cBhvr>
+                                        <p:cTn id="34" dur="1" fill="hold">
+                                          <p:stCondLst>
+                                            <p:cond delay="0"/>
+                                          </p:stCondLst>
+                                        </p:cTn>
+                                        <p:tgtEl>
+                                          <p:spTgt spid="3">
+                                            <p:txEl>
+                                              <p:pRg st="7" end="7"/>
+                                            </p:txEl>
+                                          </p:spTgt>
+                                        </p:tgtEl>
+                                        <p:attrNameLst>
+                                          <p:attrName>style.visibility</p:attrName>
+                                        </p:attrNameLst>
+                                      </p:cBhvr>
+                                      <p:to>
+                                        <p:strVal val="visible"/>
+                                      </p:to>
+                                    </p:set>
+                                  </p:childTnLst>
+                                </p:cTn>
+                              </p:par>
+                            </p:childTnLst>
+                          </p:cTn>
+                        </p:par>
+                      </p:childTnLst>
+                    </p:cTn>
+                  </p:par>
+                </p:childTnLst>
+              </p:cTn>
+              <p:prevCondLst>
+                <p:cond evt="onPrev" delay="0">
+                  <p:tgtEl>
+                    <p:sldTgt/>
+                  </p:tgtEl>
+                </p:cond>
+              </p:prevCondLst>
+              <p:nextCondLst>
+                <p:cond evt="onNext" delay="0">
+                  <p:tgtEl>
+                    <p:sldTgt/>
+                  </p:tgtEl>
+                </p:cond>
+              </p:nextCondLst>
+            </p:seq>
+          </p:childTnLst>
+        </p:cTn>
       </p:par>
     </p:tnLst>
+    <p:bldLst>
+      <p:bldP spid="3" grpId="0" uiExpand="1" build="p"/>
+    </p:bldLst>
   </p:timing>
 </p:sld>
 </file>
@@ -13207,14 +12726,6 @@
 <file path=ppt/slides/slide3.xml><?xml version="1.0" encoding="utf-8"?>
 <p:sld xmlns:a="http://schemas.openxmlformats.org/drawingml/2006/main" xmlns:r="http://schemas.openxmlformats.org/officeDocument/2006/relationships" xmlns:p="http://schemas.openxmlformats.org/presentationml/2006/main">
   <p:cSld>
-    <p:bg>
-      <p:bgPr>
-        <a:solidFill>
-          <a:schemeClr val="tx2"/>
-        </a:solidFill>
-        <a:effectLst/>
-      </p:bgPr>
-    </p:bg>
     <p:spTree>
       <p:nvGrpSpPr>
         <p:cNvPr id="1" name=""/>
@@ -13231,22 +12742,27 @@
       </p:grpSpPr>
       <p:sp>
         <p:nvSpPr>
-          <p:cNvPr id="2" name="Tittel 1"/>
-          <p:cNvSpPr>
-            <a:spLocks noGrp="1"/>
-          </p:cNvSpPr>
-          <p:nvPr>
-            <p:ph type="ctrTitle"/>
-          </p:nvPr>
-        </p:nvSpPr>
-        <p:spPr/>
+          <p:cNvPr id="2" name="Title 1"/>
+          <p:cNvSpPr>
+            <a:spLocks noGrp="1"/>
+          </p:cNvSpPr>
+          <p:nvPr>
+            <p:ph type="title"/>
+          </p:nvPr>
+        </p:nvSpPr>
+        <p:spPr>
+          <a:xfrm>
+            <a:off x="392391" y="561670"/>
+            <a:ext cx="3388315" cy="276999"/>
+          </a:xfrm>
+        </p:spPr>
         <p:txBody>
           <a:bodyPr/>
           <a:lstStyle/>
           <a:p>
             <a:r>
               <a:rPr lang="nb-NO" dirty="0" smtClean="0"/>
-              <a:t>SWP GENERELT</a:t>
+              <a:t>Om Computas</a:t>
             </a:r>
             <a:endParaRPr lang="nb-NO" dirty="0"/>
           </a:p>
@@ -13254,7 +12770,158 @@
       </p:sp>
       <p:sp>
         <p:nvSpPr>
-          <p:cNvPr id="4" name="Plassholder for lysbildenummer 3"/>
+          <p:cNvPr id="3" name="Content Placeholder 2"/>
+          <p:cNvSpPr>
+            <a:spLocks noGrp="1"/>
+          </p:cNvSpPr>
+          <p:nvPr>
+            <p:ph idx="1"/>
+          </p:nvPr>
+        </p:nvSpPr>
+        <p:spPr/>
+        <p:txBody>
+          <a:bodyPr>
+            <a:normAutofit/>
+          </a:bodyPr>
+          <a:lstStyle/>
+          <a:p>
+            <a:r>
+              <a:rPr lang="nb-NO" dirty="0" smtClean="0"/>
+              <a:t>Konsulentselskap med totalt ca. 300 ansatte.</a:t>
+            </a:r>
+          </a:p>
+          <a:p>
+            <a:r>
+              <a:rPr lang="nb-NO" dirty="0" smtClean="0"/>
+              <a:t>Kontor på Lysaker, i Stavanger og i </a:t>
+            </a:r>
+            <a:r>
+              <a:rPr lang="nb-NO" dirty="0" err="1" smtClean="0"/>
+              <a:t>București</a:t>
+            </a:r>
+            <a:r>
+              <a:rPr lang="nb-NO" dirty="0" smtClean="0"/>
+              <a:t> (Romania)</a:t>
+            </a:r>
+            <a:endParaRPr lang="nb-NO" dirty="0"/>
+          </a:p>
+          <a:p>
+            <a:r>
+              <a:rPr lang="nb-NO" dirty="0" smtClean="0"/>
+              <a:t>Grunnlagt i 1985, skilt ut fra Norske Veritas</a:t>
+            </a:r>
+          </a:p>
+          <a:p>
+            <a:r>
+              <a:rPr lang="nb-NO" dirty="0" smtClean="0"/>
+              <a:t>100% </a:t>
+            </a:r>
+            <a:r>
+              <a:rPr lang="nb-NO" dirty="0" err="1" smtClean="0"/>
+              <a:t>ansatteid</a:t>
+            </a:r>
+            <a:endParaRPr lang="nb-NO" dirty="0" smtClean="0"/>
+          </a:p>
+          <a:p>
+            <a:r>
+              <a:rPr lang="nb-NO" dirty="0" smtClean="0"/>
+              <a:t>Kunder</a:t>
+            </a:r>
+          </a:p>
+          <a:p>
+            <a:pPr lvl="1"/>
+            <a:r>
+              <a:rPr lang="nb-NO" dirty="0" smtClean="0"/>
+              <a:t>Offentlig</a:t>
+            </a:r>
+          </a:p>
+          <a:p>
+            <a:pPr lvl="1"/>
+            <a:r>
+              <a:rPr lang="nb-NO" dirty="0" smtClean="0"/>
+              <a:t>Olje og gass</a:t>
+            </a:r>
+          </a:p>
+          <a:p>
+            <a:pPr lvl="1"/>
+            <a:r>
+              <a:rPr lang="nb-NO" dirty="0" smtClean="0"/>
+              <a:t>Internasjonalt</a:t>
+            </a:r>
+          </a:p>
+          <a:p>
+            <a:r>
+              <a:rPr lang="nb-NO" dirty="0" smtClean="0"/>
+              <a:t>Ansatte</a:t>
+            </a:r>
+          </a:p>
+          <a:p>
+            <a:pPr lvl="1"/>
+            <a:r>
+              <a:rPr lang="nb-NO" dirty="0" smtClean="0"/>
+              <a:t>90% har mastergrad eller høyere utdanning</a:t>
+            </a:r>
+          </a:p>
+          <a:p>
+            <a:pPr lvl="1"/>
+            <a:r>
+              <a:rPr lang="nb-NO" dirty="0" smtClean="0"/>
+              <a:t>Over 30% kvinner</a:t>
+            </a:r>
+          </a:p>
+          <a:p>
+            <a:pPr lvl="1"/>
+            <a:r>
+              <a:rPr lang="nb-NO" dirty="0" smtClean="0"/>
+              <a:t>Gjennomsnittsalder 37 år</a:t>
+            </a:r>
+          </a:p>
+          <a:p>
+            <a:pPr lvl="1"/>
+            <a:r>
+              <a:rPr lang="nb-NO" dirty="0" smtClean="0"/>
+              <a:t>Lav turnover (for å være konsulentselskap)</a:t>
+            </a:r>
+          </a:p>
+          <a:p>
+            <a:endParaRPr lang="nb-NO" sz="1600" dirty="0"/>
+          </a:p>
+        </p:txBody>
+      </p:sp>
+      <p:sp>
+        <p:nvSpPr>
+          <p:cNvPr id="4" name="Picture Placeholder 3"/>
+          <p:cNvSpPr>
+            <a:spLocks noGrp="1"/>
+          </p:cNvSpPr>
+          <p:nvPr>
+            <p:ph type="pic" sz="quarter" idx="14"/>
+          </p:nvPr>
+        </p:nvSpPr>
+        <p:spPr/>
+      </p:sp>
+      <p:sp>
+        <p:nvSpPr>
+          <p:cNvPr id="5" name="Text Placeholder 4"/>
+          <p:cNvSpPr>
+            <a:spLocks noGrp="1"/>
+          </p:cNvSpPr>
+          <p:nvPr>
+            <p:ph type="body" sz="quarter" idx="13"/>
+          </p:nvPr>
+        </p:nvSpPr>
+        <p:spPr/>
+        <p:txBody>
+          <a:bodyPr/>
+          <a:lstStyle/>
+          <a:p>
+            <a:endParaRPr lang="nb-NO"/>
+          </a:p>
+        </p:txBody>
+      </p:sp>
+      <p:sp>
+        <p:nvSpPr>
+          <p:cNvPr id="6" name="Slide Number Placeholder 5"/>
           <p:cNvSpPr>
             <a:spLocks noGrp="1"/>
           </p:cNvSpPr>
@@ -13276,33 +12943,10 @@
           </a:p>
         </p:txBody>
       </p:sp>
-      <p:pic>
-        <p:nvPicPr>
-          <p:cNvPr id="5" name="Plassholder for bilde 3"/>
-          <p:cNvPicPr>
-            <a:picLocks noGrp="1" noChangeAspect="1"/>
-          </p:cNvPicPr>
-          <p:nvPr>
-            <p:ph type="pic" sz="quarter" idx="11"/>
-          </p:nvPr>
-        </p:nvPicPr>
-        <p:blipFill rotWithShape="1">
-          <a:blip r:embed="rId2">
-            <a:extLst>
-              <a:ext uri="{28A0092B-C50C-407E-A947-70E740481C1C}">
-                <a14:useLocalDpi xmlns:a14="http://schemas.microsoft.com/office/drawing/2010/main" val="0"/>
-              </a:ext>
-            </a:extLst>
-          </a:blip>
-          <a:srcRect l="2827" r="2827"/>
-          <a:stretch/>
-        </p:blipFill>
-        <p:spPr/>
-      </p:pic>
     </p:spTree>
     <p:extLst>
       <p:ext uri="{BB962C8B-B14F-4D97-AF65-F5344CB8AC3E}">
-        <p14:creationId xmlns:p14="http://schemas.microsoft.com/office/powerpoint/2010/main" val="2649797830"/>
+        <p14:creationId xmlns:p14="http://schemas.microsoft.com/office/powerpoint/2010/main" val="4025405499"/>
       </p:ext>
     </p:extLst>
   </p:cSld>
@@ -13322,14 +12966,6 @@
 <file path=ppt/slides/slide4.xml><?xml version="1.0" encoding="utf-8"?>
 <p:sld xmlns:a="http://schemas.openxmlformats.org/drawingml/2006/main" xmlns:r="http://schemas.openxmlformats.org/officeDocument/2006/relationships" xmlns:p="http://schemas.openxmlformats.org/presentationml/2006/main">
   <p:cSld>
-    <p:bg>
-      <p:bgPr>
-        <a:solidFill>
-          <a:srgbClr val="F0F0F2"/>
-        </a:solidFill>
-        <a:effectLst/>
-      </p:bgPr>
-    </p:bg>
     <p:spTree>
       <p:nvGrpSpPr>
         <p:cNvPr id="1" name=""/>
@@ -13346,7 +12982,7 @@
       </p:grpSpPr>
       <p:sp>
         <p:nvSpPr>
-          <p:cNvPr id="5" name="Tittel 4"/>
+          <p:cNvPr id="2" name="Title 1"/>
           <p:cNvSpPr>
             <a:spLocks noGrp="1"/>
           </p:cNvSpPr>
@@ -13354,14 +12990,19 @@
             <p:ph type="title"/>
           </p:nvPr>
         </p:nvSpPr>
-        <p:spPr/>
+        <p:spPr>
+          <a:xfrm>
+            <a:off x="392391" y="561670"/>
+            <a:ext cx="3388315" cy="276999"/>
+          </a:xfrm>
+        </p:spPr>
         <p:txBody>
           <a:bodyPr/>
           <a:lstStyle/>
           <a:p>
             <a:r>
               <a:rPr lang="nb-NO" dirty="0" smtClean="0"/>
-              <a:t>SPARQL Web Pages - generelt</a:t>
+              <a:t>Om Oss</a:t>
             </a:r>
             <a:endParaRPr lang="nb-NO" dirty="0"/>
           </a:p>
@@ -13369,12 +13010,122 @@
       </p:sp>
       <p:sp>
         <p:nvSpPr>
-          <p:cNvPr id="3" name="Plassholder for lysbildenummer 2"/>
-          <p:cNvSpPr>
-            <a:spLocks noGrp="1"/>
-          </p:cNvSpPr>
-          <p:nvPr>
-            <p:ph type="sldNum" sz="quarter" idx="12"/>
+          <p:cNvPr id="3" name="Content Placeholder 2"/>
+          <p:cNvSpPr>
+            <a:spLocks noGrp="1"/>
+          </p:cNvSpPr>
+          <p:nvPr>
+            <p:ph idx="1"/>
+          </p:nvPr>
+        </p:nvSpPr>
+        <p:spPr/>
+        <p:txBody>
+          <a:bodyPr>
+            <a:normAutofit/>
+          </a:bodyPr>
+          <a:lstStyle/>
+          <a:p>
+            <a:r>
+              <a:rPr lang="nb-NO" dirty="0" smtClean="0"/>
+              <a:t>Alexander Rosbach</a:t>
+            </a:r>
+          </a:p>
+          <a:p>
+            <a:pPr lvl="1"/>
+            <a:r>
+              <a:rPr lang="nb-NO" dirty="0" smtClean="0"/>
+              <a:t>Ansatt 5.8 2013</a:t>
+            </a:r>
+          </a:p>
+          <a:p>
+            <a:pPr lvl="1"/>
+            <a:r>
+              <a:rPr lang="nb-NO" dirty="0" smtClean="0"/>
+              <a:t>Master i programutviklingsteori ved UiB </a:t>
+            </a:r>
+          </a:p>
+          <a:p>
+            <a:r>
+              <a:rPr lang="nb-NO" dirty="0" smtClean="0"/>
+              <a:t>Lisa Halvorsen</a:t>
+            </a:r>
+          </a:p>
+          <a:p>
+            <a:pPr lvl="1"/>
+            <a:r>
+              <a:rPr lang="nb-NO" dirty="0" smtClean="0"/>
+              <a:t>Ansatt 5.8. 2013</a:t>
+            </a:r>
+          </a:p>
+          <a:p>
+            <a:pPr lvl="1"/>
+            <a:r>
+              <a:rPr lang="nb-NO" dirty="0" smtClean="0"/>
+              <a:t>Master i informasjonsvitenskap ved UiB </a:t>
+            </a:r>
+          </a:p>
+          <a:p>
+            <a:r>
+              <a:rPr lang="nb-NO" dirty="0" smtClean="0"/>
+              <a:t>Torbjørn Tessem</a:t>
+            </a:r>
+          </a:p>
+          <a:p>
+            <a:pPr lvl="1"/>
+            <a:r>
+              <a:rPr lang="nb-NO" dirty="0" smtClean="0"/>
+              <a:t>Ansatt 1.1. 2014</a:t>
+            </a:r>
+          </a:p>
+          <a:p>
+            <a:pPr lvl="1"/>
+            <a:r>
+              <a:rPr lang="nb-NO" dirty="0" smtClean="0"/>
+              <a:t>Master i algoritmer ved UiB </a:t>
+            </a:r>
+            <a:endParaRPr lang="nb-NO" dirty="0"/>
+          </a:p>
+          <a:p>
+            <a:r>
+              <a:rPr lang="nb-NO" dirty="0" smtClean="0"/>
+              <a:t> …</a:t>
+            </a:r>
+          </a:p>
+        </p:txBody>
+      </p:sp>
+      <p:pic>
+        <p:nvPicPr>
+          <p:cNvPr id="8" name="Picture Placeholder 7"/>
+          <p:cNvPicPr>
+            <a:picLocks noGrp="1" noChangeAspect="1"/>
+          </p:cNvPicPr>
+          <p:nvPr>
+            <p:ph type="pic" sz="quarter" idx="14"/>
+          </p:nvPr>
+        </p:nvPicPr>
+        <p:blipFill>
+          <a:blip r:embed="rId2">
+            <a:extLst>
+              <a:ext uri="{28A0092B-C50C-407E-A947-70E740481C1C}">
+                <a14:useLocalDpi xmlns:a14="http://schemas.microsoft.com/office/drawing/2010/main" val="0"/>
+              </a:ext>
+            </a:extLst>
+          </a:blip>
+          <a:srcRect t="31" b="31"/>
+          <a:stretch>
+            <a:fillRect/>
+          </a:stretch>
+        </p:blipFill>
+        <p:spPr/>
+      </p:pic>
+      <p:sp>
+        <p:nvSpPr>
+          <p:cNvPr id="5" name="Text Placeholder 4"/>
+          <p:cNvSpPr>
+            <a:spLocks noGrp="1"/>
+          </p:cNvSpPr>
+          <p:nvPr>
+            <p:ph type="body" sz="quarter" idx="13"/>
           </p:nvPr>
         </p:nvSpPr>
         <p:spPr/>
@@ -13382,240 +13133,38 @@
           <a:bodyPr/>
           <a:lstStyle/>
           <a:p>
+            <a:endParaRPr lang="nb-NO"/>
+          </a:p>
+        </p:txBody>
+      </p:sp>
+      <p:sp>
+        <p:nvSpPr>
+          <p:cNvPr id="6" name="Slide Number Placeholder 5"/>
+          <p:cNvSpPr>
+            <a:spLocks noGrp="1"/>
+          </p:cNvSpPr>
+          <p:nvPr>
+            <p:ph type="sldNum" sz="quarter" idx="4"/>
+          </p:nvPr>
+        </p:nvSpPr>
+        <p:spPr/>
+        <p:txBody>
+          <a:bodyPr/>
+          <a:lstStyle/>
+          <a:p>
             <a:fld id="{0AE548F1-6D36-4902-B57A-69A845AA9B7E}" type="slidenum">
               <a:rPr lang="nb-NO" smtClean="0"/>
+              <a:pPr/>
               <a:t>4</a:t>
             </a:fld>
             <a:endParaRPr lang="nb-NO" dirty="0"/>
           </a:p>
         </p:txBody>
       </p:sp>
-      <p:sp>
-        <p:nvSpPr>
-          <p:cNvPr id="6" name="Plassholder for innhold 5"/>
-          <p:cNvSpPr txBox="1">
-            <a:spLocks/>
-          </p:cNvSpPr>
-          <p:nvPr/>
-        </p:nvSpPr>
-        <p:spPr>
-          <a:xfrm>
-            <a:off x="180306" y="1178269"/>
-            <a:ext cx="7992888" cy="1636422"/>
-          </a:xfrm>
-          <a:prstGeom prst="rect">
-            <a:avLst/>
-          </a:prstGeom>
-        </p:spPr>
-        <p:txBody>
-          <a:bodyPr/>
-          <a:lstStyle>
-            <a:lvl1pPr marL="200025" indent="-200025" algn="l" defTabSz="816479" rtl="0" eaLnBrk="1" latinLnBrk="0" hangingPunct="1">
-              <a:lnSpc>
-                <a:spcPct val="140000"/>
-              </a:lnSpc>
-              <a:spcBef>
-                <a:spcPts val="0"/>
-              </a:spcBef>
-              <a:buFont typeface="Arial" pitchFamily="34" charset="0"/>
-              <a:buChar char="•"/>
-              <a:defRPr sz="1100" kern="1200">
-                <a:solidFill>
-                  <a:srgbClr val="545454"/>
-                </a:solidFill>
-                <a:latin typeface="+mn-lt"/>
-                <a:ea typeface="+mn-ea"/>
-                <a:cs typeface="+mn-cs"/>
-              </a:defRPr>
-            </a:lvl1pPr>
-            <a:lvl2pPr marL="663389" indent="-255150" algn="l" defTabSz="816479" rtl="0" eaLnBrk="1" latinLnBrk="0" hangingPunct="1">
-              <a:lnSpc>
-                <a:spcPct val="140000"/>
-              </a:lnSpc>
-              <a:spcBef>
-                <a:spcPts val="0"/>
-              </a:spcBef>
-              <a:buFont typeface="Arial" pitchFamily="34" charset="0"/>
-              <a:buChar char="–"/>
-              <a:defRPr sz="1100" kern="1200">
-                <a:solidFill>
-                  <a:srgbClr val="545454"/>
-                </a:solidFill>
-                <a:latin typeface="+mn-lt"/>
-                <a:ea typeface="+mn-ea"/>
-                <a:cs typeface="+mn-cs"/>
-              </a:defRPr>
-            </a:lvl2pPr>
-            <a:lvl3pPr marL="1020599" indent="-204120" algn="l" defTabSz="816479" rtl="0" eaLnBrk="1" latinLnBrk="0" hangingPunct="1">
-              <a:lnSpc>
-                <a:spcPct val="140000"/>
-              </a:lnSpc>
-              <a:spcBef>
-                <a:spcPts val="0"/>
-              </a:spcBef>
-              <a:buFont typeface="Arial" pitchFamily="34" charset="0"/>
-              <a:buChar char="•"/>
-              <a:defRPr sz="1100" kern="1200">
-                <a:solidFill>
-                  <a:srgbClr val="545454"/>
-                </a:solidFill>
-                <a:latin typeface="+mn-lt"/>
-                <a:ea typeface="+mn-ea"/>
-                <a:cs typeface="+mn-cs"/>
-              </a:defRPr>
-            </a:lvl3pPr>
-            <a:lvl4pPr marL="1428838" indent="-204120" algn="l" defTabSz="816479" rtl="0" eaLnBrk="1" latinLnBrk="0" hangingPunct="1">
-              <a:lnSpc>
-                <a:spcPct val="140000"/>
-              </a:lnSpc>
-              <a:spcBef>
-                <a:spcPts val="0"/>
-              </a:spcBef>
-              <a:buFont typeface="Arial" pitchFamily="34" charset="0"/>
-              <a:buChar char="–"/>
-              <a:defRPr sz="1100" kern="1200">
-                <a:solidFill>
-                  <a:srgbClr val="545454"/>
-                </a:solidFill>
-                <a:latin typeface="+mn-lt"/>
-                <a:ea typeface="+mn-ea"/>
-                <a:cs typeface="+mn-cs"/>
-              </a:defRPr>
-            </a:lvl4pPr>
-            <a:lvl5pPr marL="1837078" indent="-204120" algn="l" defTabSz="816479" rtl="0" eaLnBrk="1" latinLnBrk="0" hangingPunct="1">
-              <a:lnSpc>
-                <a:spcPct val="140000"/>
-              </a:lnSpc>
-              <a:spcBef>
-                <a:spcPts val="0"/>
-              </a:spcBef>
-              <a:buFont typeface="Arial" pitchFamily="34" charset="0"/>
-              <a:buChar char="»"/>
-              <a:defRPr sz="1100" kern="1200">
-                <a:solidFill>
-                  <a:srgbClr val="545454"/>
-                </a:solidFill>
-                <a:latin typeface="+mn-lt"/>
-                <a:ea typeface="+mn-ea"/>
-                <a:cs typeface="+mn-cs"/>
-              </a:defRPr>
-            </a:lvl5pPr>
-            <a:lvl6pPr marL="2245318" indent="-204120" algn="l" defTabSz="816479" rtl="0" eaLnBrk="1" latinLnBrk="0" hangingPunct="1">
-              <a:spcBef>
-                <a:spcPct val="20000"/>
-              </a:spcBef>
-              <a:buFont typeface="Arial" pitchFamily="34" charset="0"/>
-              <a:buChar char="•"/>
-              <a:defRPr sz="1800" kern="1200">
-                <a:solidFill>
-                  <a:schemeClr val="tx1"/>
-                </a:solidFill>
-                <a:latin typeface="+mn-lt"/>
-                <a:ea typeface="+mn-ea"/>
-                <a:cs typeface="+mn-cs"/>
-              </a:defRPr>
-            </a:lvl6pPr>
-            <a:lvl7pPr marL="2653557" indent="-204120" algn="l" defTabSz="816479" rtl="0" eaLnBrk="1" latinLnBrk="0" hangingPunct="1">
-              <a:spcBef>
-                <a:spcPct val="20000"/>
-              </a:spcBef>
-              <a:buFont typeface="Arial" pitchFamily="34" charset="0"/>
-              <a:buChar char="•"/>
-              <a:defRPr sz="1800" kern="1200">
-                <a:solidFill>
-                  <a:schemeClr val="tx1"/>
-                </a:solidFill>
-                <a:latin typeface="+mn-lt"/>
-                <a:ea typeface="+mn-ea"/>
-                <a:cs typeface="+mn-cs"/>
-              </a:defRPr>
-            </a:lvl7pPr>
-            <a:lvl8pPr marL="3061797" indent="-204120" algn="l" defTabSz="816479" rtl="0" eaLnBrk="1" latinLnBrk="0" hangingPunct="1">
-              <a:spcBef>
-                <a:spcPct val="20000"/>
-              </a:spcBef>
-              <a:buFont typeface="Arial" pitchFamily="34" charset="0"/>
-              <a:buChar char="•"/>
-              <a:defRPr sz="1800" kern="1200">
-                <a:solidFill>
-                  <a:schemeClr val="tx1"/>
-                </a:solidFill>
-                <a:latin typeface="+mn-lt"/>
-                <a:ea typeface="+mn-ea"/>
-                <a:cs typeface="+mn-cs"/>
-              </a:defRPr>
-            </a:lvl8pPr>
-            <a:lvl9pPr marL="3470037" indent="-204120" algn="l" defTabSz="816479" rtl="0" eaLnBrk="1" latinLnBrk="0" hangingPunct="1">
-              <a:spcBef>
-                <a:spcPct val="20000"/>
-              </a:spcBef>
-              <a:buFont typeface="Arial" pitchFamily="34" charset="0"/>
-              <a:buChar char="•"/>
-              <a:defRPr sz="1800" kern="1200">
-                <a:solidFill>
-                  <a:schemeClr val="tx1"/>
-                </a:solidFill>
-                <a:latin typeface="+mn-lt"/>
-                <a:ea typeface="+mn-ea"/>
-                <a:cs typeface="+mn-cs"/>
-              </a:defRPr>
-            </a:lvl9pPr>
-          </a:lstStyle>
-          <a:p>
-            <a:pPr>
-              <a:buFont typeface="Arial"/>
-              <a:buChar char="•"/>
-            </a:pPr>
-            <a:r>
-              <a:rPr lang="nb-NO" sz="1400" dirty="0" smtClean="0"/>
-              <a:t>RDF-basert rammeverk for å visualisere semantisk web data</a:t>
-            </a:r>
-          </a:p>
-          <a:p>
-            <a:pPr>
-              <a:buFont typeface="Arial"/>
-              <a:buChar char="•"/>
-            </a:pPr>
-            <a:r>
-              <a:rPr lang="nb-NO" sz="1400" dirty="0" smtClean="0"/>
-              <a:t>Tilegne RDF-basert metadata til ressurser og klasser</a:t>
-            </a:r>
-          </a:p>
-          <a:p>
-            <a:pPr>
-              <a:buFont typeface="Arial"/>
-              <a:buChar char="•"/>
-            </a:pPr>
-            <a:r>
-              <a:rPr lang="nb-NO" sz="1400" dirty="0" smtClean="0"/>
-              <a:t>Bistå web-</a:t>
-            </a:r>
-            <a:r>
-              <a:rPr lang="nb-NO" sz="1400" dirty="0" err="1" smtClean="0"/>
-              <a:t>browsere</a:t>
-            </a:r>
-            <a:r>
-              <a:rPr lang="nb-NO" sz="1400" dirty="0" smtClean="0"/>
-              <a:t> til å vise egnede og attraktive visualiseringer av RDF ressurser</a:t>
-            </a:r>
-          </a:p>
-          <a:p>
-            <a:pPr>
-              <a:buFont typeface="Arial"/>
-              <a:buChar char="•"/>
-            </a:pPr>
-            <a:r>
-              <a:rPr lang="nb-NO" sz="1400" dirty="0" smtClean="0"/>
-              <a:t>Vokabularer for å definere hvordan ressurser skal visualiseres</a:t>
-            </a:r>
-            <a:endParaRPr lang="nb-NO" sz="1400" dirty="0"/>
-          </a:p>
-        </p:txBody>
-      </p:sp>
     </p:spTree>
     <p:extLst>
       <p:ext uri="{BB962C8B-B14F-4D97-AF65-F5344CB8AC3E}">
-        <p14:creationId xmlns:p14="http://schemas.microsoft.com/office/powerpoint/2010/main" val="3912343444"/>
+        <p14:creationId xmlns:p14="http://schemas.microsoft.com/office/powerpoint/2010/main" val="1963146835"/>
       </p:ext>
     </p:extLst>
   </p:cSld>
@@ -13635,14 +13184,6 @@
 <file path=ppt/slides/slide5.xml><?xml version="1.0" encoding="utf-8"?>
 <p:sld xmlns:a="http://schemas.openxmlformats.org/drawingml/2006/main" xmlns:r="http://schemas.openxmlformats.org/officeDocument/2006/relationships" xmlns:p="http://schemas.openxmlformats.org/presentationml/2006/main">
   <p:cSld>
-    <p:bg>
-      <p:bgPr>
-        <a:solidFill>
-          <a:schemeClr val="bg2"/>
-        </a:solidFill>
-        <a:effectLst/>
-      </p:bgPr>
-    </p:bg>
     <p:spTree>
       <p:nvGrpSpPr>
         <p:cNvPr id="1" name=""/>
@@ -13659,161 +13200,60 @@
       </p:grpSpPr>
       <p:sp>
         <p:nvSpPr>
-          <p:cNvPr id="2" name="Tittel 1"/>
-          <p:cNvSpPr>
-            <a:spLocks noGrp="1"/>
-          </p:cNvSpPr>
-          <p:nvPr>
-            <p:ph type="title"/>
-          </p:nvPr>
-        </p:nvSpPr>
-        <p:spPr>
-          <a:xfrm>
-            <a:off x="390173" y="412304"/>
-            <a:ext cx="6714922" cy="369332"/>
-          </a:xfrm>
-        </p:spPr>
+          <p:cNvPr id="2" name="Title 1"/>
+          <p:cNvSpPr>
+            <a:spLocks noGrp="1"/>
+          </p:cNvSpPr>
+          <p:nvPr>
+            <p:ph type="ctrTitle"/>
+          </p:nvPr>
+        </p:nvSpPr>
+        <p:spPr/>
         <p:txBody>
           <a:bodyPr/>
           <a:lstStyle/>
           <a:p>
             <a:r>
               <a:rPr lang="nb-NO" dirty="0" smtClean="0"/>
-              <a:t>Hvorfor SWP?</a:t>
+              <a:t>Semantisk Web for Nybegynnere</a:t>
             </a:r>
             <a:endParaRPr lang="nb-NO" dirty="0"/>
           </a:p>
         </p:txBody>
       </p:sp>
-      <p:sp>
-        <p:nvSpPr>
-          <p:cNvPr id="20" name="Plassholder for innhold 19"/>
-          <p:cNvSpPr>
-            <a:spLocks noGrp="1"/>
-          </p:cNvSpPr>
-          <p:nvPr>
-            <p:ph idx="1"/>
-          </p:nvPr>
-        </p:nvSpPr>
-        <p:spPr>
-          <a:xfrm>
-            <a:off x="390172" y="1272199"/>
-            <a:ext cx="6630893" cy="1804402"/>
-          </a:xfrm>
-        </p:spPr>
-        <p:txBody>
-          <a:bodyPr/>
-          <a:lstStyle/>
-          <a:p>
-            <a:pPr marL="171450" indent="-171450">
-              <a:buFont typeface="Arial" panose="020B0604020202020204" pitchFamily="34" charset="0"/>
-              <a:buChar char="•"/>
-            </a:pPr>
-            <a:r>
-              <a:rPr lang="nb-NO" sz="1600" dirty="0" smtClean="0"/>
-              <a:t>Mangel på enkle og generiske kontekstdrevne visualiseringsrammeverk</a:t>
-            </a:r>
-          </a:p>
-          <a:p>
-            <a:pPr marL="834839" lvl="1" indent="-171450">
-              <a:buFont typeface="Arial" panose="020B0604020202020204" pitchFamily="34" charset="0"/>
-              <a:buChar char="•"/>
-            </a:pPr>
-            <a:r>
-              <a:rPr lang="nb-NO" sz="1600" dirty="0" smtClean="0"/>
-              <a:t>Hardkoding</a:t>
-            </a:r>
-          </a:p>
-          <a:p>
-            <a:pPr marL="834839" lvl="1" indent="-171450">
-              <a:buFont typeface="Arial" panose="020B0604020202020204" pitchFamily="34" charset="0"/>
-              <a:buChar char="•"/>
-            </a:pPr>
-            <a:r>
-              <a:rPr lang="nb-NO" sz="1600" dirty="0" smtClean="0"/>
-              <a:t>Kompleks kode/script</a:t>
-            </a:r>
-          </a:p>
-          <a:p>
-            <a:pPr marL="834839" lvl="1" indent="-171450">
-              <a:buFont typeface="Arial" panose="020B0604020202020204" pitchFamily="34" charset="0"/>
-              <a:buChar char="•"/>
-            </a:pPr>
-            <a:r>
-              <a:rPr lang="nb-NO" sz="1600" dirty="0" smtClean="0"/>
-              <a:t>Mangel på kontekst</a:t>
-            </a:r>
-          </a:p>
-          <a:p>
-            <a:pPr marL="171450" indent="-171450">
-              <a:buFont typeface="Arial" panose="020B0604020202020204" pitchFamily="34" charset="0"/>
-              <a:buChar char="•"/>
-            </a:pPr>
-            <a:endParaRPr lang="nb-NO" sz="1600" dirty="0" smtClean="0"/>
-          </a:p>
-          <a:p>
-            <a:pPr marL="171450" indent="-171450">
-              <a:buFont typeface="Arial" panose="020B0604020202020204" pitchFamily="34" charset="0"/>
-              <a:buChar char="•"/>
-            </a:pPr>
-            <a:r>
-              <a:rPr lang="nb-NO" sz="1600" dirty="0" smtClean="0"/>
-              <a:t>SWP er dynamisk</a:t>
-            </a:r>
-          </a:p>
-          <a:p>
-            <a:pPr marL="834839" lvl="1" indent="-171450">
-              <a:buFont typeface="Arial" panose="020B0604020202020204" pitchFamily="34" charset="0"/>
-              <a:buChar char="•"/>
-            </a:pPr>
-            <a:r>
-              <a:rPr lang="nb-NO" sz="1600" dirty="0" smtClean="0"/>
-              <a:t>Kontekst-, data- og modelldrevet visualisering</a:t>
-            </a:r>
-          </a:p>
-          <a:p>
-            <a:pPr marL="834839" lvl="1" indent="-171450">
-              <a:buFont typeface="Arial" panose="020B0604020202020204" pitchFamily="34" charset="0"/>
-              <a:buChar char="•"/>
-            </a:pPr>
-            <a:r>
-              <a:rPr lang="nb-NO" sz="1600" dirty="0" smtClean="0"/>
-              <a:t>Brukergrensesnittkode er fleksibel og modulær</a:t>
-            </a:r>
-          </a:p>
-          <a:p>
-            <a:pPr marL="834839" lvl="1" indent="-171450">
-              <a:buFont typeface="Arial" panose="020B0604020202020204" pitchFamily="34" charset="0"/>
-              <a:buChar char="•"/>
-            </a:pPr>
-            <a:endParaRPr lang="nb-NO" sz="1600" dirty="0" smtClean="0"/>
-          </a:p>
-          <a:p>
-            <a:pPr marL="834839" lvl="1" indent="-171450">
-              <a:buFont typeface="Arial" panose="020B0604020202020204" pitchFamily="34" charset="0"/>
-              <a:buChar char="•"/>
-            </a:pPr>
-            <a:endParaRPr lang="nb-NO" sz="1600" dirty="0"/>
-          </a:p>
-          <a:p>
-            <a:pPr marL="171450" indent="-171450">
-              <a:buFont typeface="Arial" panose="020B0604020202020204" pitchFamily="34" charset="0"/>
-              <a:buChar char="•"/>
-            </a:pPr>
-            <a:endParaRPr lang="nb-NO" sz="1600" dirty="0" smtClean="0"/>
-          </a:p>
-          <a:p>
-            <a:pPr marL="171450" indent="-171450">
-              <a:buFont typeface="Arial" panose="020B0604020202020204" pitchFamily="34" charset="0"/>
-              <a:buChar char="•"/>
-            </a:pPr>
-            <a:endParaRPr lang="nb-NO" dirty="0"/>
-          </a:p>
-        </p:txBody>
-      </p:sp>
-      <p:sp>
-        <p:nvSpPr>
-          <p:cNvPr id="12" name="Plassholder for lysbildenummer 11"/>
+      <p:pic>
+        <p:nvPicPr>
+          <p:cNvPr id="8" name="Picture Placeholder 7"/>
+          <p:cNvPicPr>
+            <a:picLocks noGrp="1" noChangeAspect="1"/>
+          </p:cNvPicPr>
+          <p:nvPr>
+            <p:ph type="pic" sz="quarter" idx="11"/>
+          </p:nvPr>
+        </p:nvPicPr>
+        <p:blipFill>
+          <a:blip r:embed="rId2" cstate="print">
+            <a:extLst>
+              <a:ext uri="{28A0092B-C50C-407E-A947-70E740481C1C}">
+                <a14:useLocalDpi xmlns:a14="http://schemas.microsoft.com/office/drawing/2010/main" val="0"/>
+              </a:ext>
+            </a:extLst>
+          </a:blip>
+          <a:srcRect t="3487" b="3487"/>
+          <a:stretch>
+            <a:fillRect/>
+          </a:stretch>
+        </p:blipFill>
+        <p:spPr>
+          <a:xfrm>
+            <a:off x="3492674" y="844351"/>
+            <a:ext cx="2086528" cy="1940771"/>
+          </a:xfrm>
+        </p:spPr>
+      </p:pic>
+      <p:sp>
+        <p:nvSpPr>
+          <p:cNvPr id="4" name="Slide Number Placeholder 3"/>
           <p:cNvSpPr>
             <a:spLocks noGrp="1"/>
           </p:cNvSpPr>
@@ -13838,7 +13278,7 @@
     </p:spTree>
     <p:extLst>
       <p:ext uri="{BB962C8B-B14F-4D97-AF65-F5344CB8AC3E}">
-        <p14:creationId xmlns:p14="http://schemas.microsoft.com/office/powerpoint/2010/main" val="2696569340"/>
+        <p14:creationId xmlns:p14="http://schemas.microsoft.com/office/powerpoint/2010/main" val="3382752553"/>
       </p:ext>
     </p:extLst>
   </p:cSld>
@@ -13874,7 +13314,7 @@
       </p:grpSpPr>
       <p:sp>
         <p:nvSpPr>
-          <p:cNvPr id="2" name="Tittel 1"/>
+          <p:cNvPr id="2" name="Title 1"/>
           <p:cNvSpPr>
             <a:spLocks noGrp="1"/>
           </p:cNvSpPr>
@@ -13884,8 +13324,8 @@
         </p:nvSpPr>
         <p:spPr>
           <a:xfrm>
-            <a:off x="509554" y="650104"/>
-            <a:ext cx="6714922" cy="369332"/>
+            <a:off x="392391" y="561670"/>
+            <a:ext cx="3388315" cy="276999"/>
           </a:xfrm>
         </p:spPr>
         <p:txBody>
@@ -13894,7 +13334,15 @@
           <a:p>
             <a:r>
               <a:rPr lang="nb-NO" dirty="0" smtClean="0"/>
-              <a:t>STYRKER 				SVAKHETER</a:t>
+              <a:t>The </a:t>
+            </a:r>
+            <a:r>
+              <a:rPr lang="nb-NO" dirty="0" err="1" smtClean="0"/>
+              <a:t>Semantic</a:t>
+            </a:r>
+            <a:r>
+              <a:rPr lang="nb-NO" dirty="0" smtClean="0"/>
+              <a:t> Web</a:t>
             </a:r>
             <a:endParaRPr lang="nb-NO" dirty="0"/>
           </a:p>
@@ -13902,7 +13350,7 @@
       </p:sp>
       <p:sp>
         <p:nvSpPr>
-          <p:cNvPr id="3" name="Plassholder for innhold 2"/>
+          <p:cNvPr id="3" name="Content Placeholder 2"/>
           <p:cNvSpPr>
             <a:spLocks noGrp="1"/>
           </p:cNvSpPr>
@@ -13910,65 +13358,63 @@
             <p:ph idx="1"/>
           </p:nvPr>
         </p:nvSpPr>
-        <p:spPr>
-          <a:xfrm>
-            <a:off x="509554" y="1443176"/>
-            <a:ext cx="2592288" cy="3189691"/>
-          </a:xfrm>
-        </p:spPr>
+        <p:spPr/>
+        <p:txBody>
+          <a:bodyPr>
+            <a:normAutofit/>
+          </a:bodyPr>
+          <a:lstStyle/>
+          <a:p>
+            <a:r>
+              <a:rPr lang="nb-NO" sz="1600" dirty="0" smtClean="0"/>
+              <a:t>W3C </a:t>
+            </a:r>
+          </a:p>
+          <a:p>
+            <a:r>
+              <a:rPr lang="nb-NO" sz="1600" dirty="0" smtClean="0"/>
+              <a:t>Tim Berners Lee </a:t>
+            </a:r>
+          </a:p>
+          <a:p>
+            <a:endParaRPr lang="nb-NO" sz="1600" dirty="0"/>
+          </a:p>
+        </p:txBody>
+      </p:sp>
+      <p:sp>
+        <p:nvSpPr>
+          <p:cNvPr id="4" name="Picture Placeholder 3"/>
+          <p:cNvSpPr>
+            <a:spLocks noGrp="1"/>
+          </p:cNvSpPr>
+          <p:nvPr>
+            <p:ph type="pic" sz="quarter" idx="14"/>
+          </p:nvPr>
+        </p:nvSpPr>
+        <p:spPr/>
+      </p:sp>
+      <p:sp>
+        <p:nvSpPr>
+          <p:cNvPr id="5" name="Text Placeholder 4"/>
+          <p:cNvSpPr>
+            <a:spLocks noGrp="1"/>
+          </p:cNvSpPr>
+          <p:nvPr>
+            <p:ph type="body" sz="quarter" idx="13"/>
+          </p:nvPr>
+        </p:nvSpPr>
+        <p:spPr/>
         <p:txBody>
           <a:bodyPr/>
           <a:lstStyle/>
           <a:p>
-            <a:pPr marL="171450" indent="-171450">
-              <a:buFont typeface="Arial"/>
-              <a:buChar char="•"/>
-            </a:pPr>
-            <a:r>
-              <a:rPr lang="nb-NO" sz="1600" dirty="0" smtClean="0"/>
-              <a:t>Fleksibelt</a:t>
-            </a:r>
-          </a:p>
-          <a:p>
-            <a:pPr marL="171450" indent="-171450">
-              <a:buFont typeface="Arial"/>
-              <a:buChar char="•"/>
-            </a:pPr>
-            <a:endParaRPr lang="nb-NO" sz="1600" dirty="0" smtClean="0"/>
-          </a:p>
-          <a:p>
-            <a:pPr marL="171450" indent="-171450">
-              <a:buFont typeface="Arial"/>
-              <a:buChar char="•"/>
-            </a:pPr>
-            <a:r>
-              <a:rPr lang="nb-NO" sz="1600" dirty="0" smtClean="0"/>
-              <a:t>Dynamisk</a:t>
-            </a:r>
-          </a:p>
-          <a:p>
-            <a:pPr marL="171450" indent="-171450">
-              <a:buFont typeface="Arial"/>
-              <a:buChar char="•"/>
-            </a:pPr>
-            <a:endParaRPr lang="nb-NO" sz="1600" dirty="0"/>
-          </a:p>
-          <a:p>
-            <a:pPr marL="171450" indent="-171450">
-              <a:buFont typeface="Arial"/>
-              <a:buChar char="•"/>
-            </a:pPr>
-            <a:r>
-              <a:rPr lang="nb-NO" sz="1600" dirty="0" smtClean="0"/>
-              <a:t>Lav kompleksitet</a:t>
-            </a:r>
-            <a:endParaRPr lang="nb-NO" sz="1600" dirty="0"/>
-          </a:p>
-        </p:txBody>
-      </p:sp>
-      <p:sp>
-        <p:nvSpPr>
-          <p:cNvPr id="19" name="Plassholder for lysbildenummer 18"/>
+            <a:endParaRPr lang="nb-NO"/>
+          </a:p>
+        </p:txBody>
+      </p:sp>
+      <p:sp>
+        <p:nvSpPr>
+          <p:cNvPr id="6" name="Slide Number Placeholder 5"/>
           <p:cNvSpPr>
             <a:spLocks noGrp="1"/>
           </p:cNvSpPr>
@@ -13990,76 +13436,10 @@
           </a:p>
         </p:txBody>
       </p:sp>
-      <p:sp>
-        <p:nvSpPr>
-          <p:cNvPr id="27" name="Plassholder for innhold 2"/>
-          <p:cNvSpPr>
-            <a:spLocks noGrp="1"/>
-          </p:cNvSpPr>
-          <p:nvPr>
-            <p:ph idx="1"/>
-          </p:nvPr>
-        </p:nvSpPr>
-        <p:spPr>
-          <a:xfrm>
-            <a:off x="4284762" y="1426170"/>
-            <a:ext cx="2592288" cy="3189691"/>
-          </a:xfrm>
-        </p:spPr>
-        <p:txBody>
-          <a:bodyPr/>
-          <a:lstStyle/>
-          <a:p>
-            <a:pPr marL="171450" indent="-171450">
-              <a:buFont typeface="Arial"/>
-              <a:buChar char="•"/>
-            </a:pPr>
-            <a:r>
-              <a:rPr lang="nb-NO" sz="1600" dirty="0" smtClean="0"/>
-              <a:t>Tekst</a:t>
-            </a:r>
-          </a:p>
-          <a:p>
-            <a:pPr marL="171450" indent="-171450">
-              <a:buFont typeface="Arial"/>
-              <a:buChar char="•"/>
-            </a:pPr>
-            <a:endParaRPr lang="nb-NO" sz="1600" dirty="0" smtClean="0"/>
-          </a:p>
-          <a:p>
-            <a:pPr marL="171450" indent="-171450">
-              <a:buFont typeface="Arial"/>
-              <a:buChar char="•"/>
-            </a:pPr>
-            <a:r>
-              <a:rPr lang="nb-NO" sz="1600" dirty="0" smtClean="0"/>
-              <a:t>Tekst</a:t>
-            </a:r>
-          </a:p>
-          <a:p>
-            <a:pPr marL="171450" indent="-171450">
-              <a:buFont typeface="Arial"/>
-              <a:buChar char="•"/>
-            </a:pPr>
-            <a:endParaRPr lang="nb-NO" sz="1600" dirty="0"/>
-          </a:p>
-          <a:p>
-            <a:pPr marL="171450" indent="-171450">
-              <a:buFont typeface="Arial"/>
-              <a:buChar char="•"/>
-            </a:pPr>
-            <a:r>
-              <a:rPr lang="nb-NO" sz="1600" dirty="0" smtClean="0"/>
-              <a:t>Tekst</a:t>
-            </a:r>
-            <a:endParaRPr lang="nb-NO" sz="1600" dirty="0"/>
-          </a:p>
-        </p:txBody>
-      </p:sp>
     </p:spTree>
     <p:extLst>
       <p:ext uri="{BB962C8B-B14F-4D97-AF65-F5344CB8AC3E}">
-        <p14:creationId xmlns:p14="http://schemas.microsoft.com/office/powerpoint/2010/main" val="3910757009"/>
+        <p14:creationId xmlns:p14="http://schemas.microsoft.com/office/powerpoint/2010/main" val="2679705624"/>
       </p:ext>
     </p:extLst>
   </p:cSld>
@@ -14095,7 +13475,7 @@
       </p:grpSpPr>
       <p:sp>
         <p:nvSpPr>
-          <p:cNvPr id="5" name="Tittel 4"/>
+          <p:cNvPr id="2" name="Title 1"/>
           <p:cNvSpPr>
             <a:spLocks noGrp="1"/>
           </p:cNvSpPr>
@@ -14106,7 +13486,7 @@
         <p:spPr>
           <a:xfrm>
             <a:off x="392391" y="561670"/>
-            <a:ext cx="3388315" cy="276999"/>
+            <a:ext cx="3604339" cy="276999"/>
           </a:xfrm>
         </p:spPr>
         <p:txBody>
@@ -14114,8 +13494,8 @@
           <a:lstStyle/>
           <a:p>
             <a:r>
-              <a:rPr lang="nb-NO" dirty="0" err="1" smtClean="0"/>
-              <a:t>Ui:Services</a:t>
+              <a:rPr lang="nb-NO" dirty="0" smtClean="0"/>
+              <a:t>RDF</a:t>
             </a:r>
             <a:endParaRPr lang="nb-NO" dirty="0"/>
           </a:p>
@@ -14123,7 +13503,7 @@
       </p:sp>
       <p:sp>
         <p:nvSpPr>
-          <p:cNvPr id="6" name="Plassholder for innhold 5"/>
+          <p:cNvPr id="3" name="Content Placeholder 2"/>
           <p:cNvSpPr>
             <a:spLocks noGrp="1"/>
           </p:cNvSpPr>
@@ -14133,77 +13513,72 @@
         </p:nvSpPr>
         <p:spPr>
           <a:xfrm>
-            <a:off x="392449" y="1296162"/>
-            <a:ext cx="3388315" cy="1636422"/>
-          </a:xfrm>
-        </p:spPr>
+            <a:off x="371481" y="1060376"/>
+            <a:ext cx="3388315" cy="3631306"/>
+          </a:xfrm>
+        </p:spPr>
+        <p:txBody>
+          <a:bodyPr>
+            <a:normAutofit/>
+          </a:bodyPr>
+          <a:lstStyle/>
+          <a:p>
+            <a:r>
+              <a:rPr lang="nb-NO" sz="1600" dirty="0" smtClean="0"/>
+              <a:t>Resource </a:t>
+            </a:r>
+            <a:r>
+              <a:rPr lang="nb-NO" sz="1600" dirty="0" err="1" smtClean="0"/>
+              <a:t>Description</a:t>
+            </a:r>
+            <a:r>
+              <a:rPr lang="nb-NO" sz="1600" dirty="0" smtClean="0"/>
+              <a:t> Framework</a:t>
+            </a:r>
+          </a:p>
+          <a:p>
+            <a:r>
+              <a:rPr lang="nb-NO" sz="1600" dirty="0" smtClean="0"/>
+              <a:t>Alt er resurser </a:t>
+            </a:r>
+            <a:endParaRPr lang="nb-NO" sz="1600" dirty="0"/>
+          </a:p>
+        </p:txBody>
+      </p:sp>
+      <p:sp>
+        <p:nvSpPr>
+          <p:cNvPr id="4" name="Picture Placeholder 3"/>
+          <p:cNvSpPr>
+            <a:spLocks noGrp="1"/>
+          </p:cNvSpPr>
+          <p:nvPr>
+            <p:ph type="pic" sz="quarter" idx="14"/>
+          </p:nvPr>
+        </p:nvSpPr>
+        <p:spPr/>
+      </p:sp>
+      <p:sp>
+        <p:nvSpPr>
+          <p:cNvPr id="5" name="Text Placeholder 4"/>
+          <p:cNvSpPr>
+            <a:spLocks noGrp="1"/>
+          </p:cNvSpPr>
+          <p:nvPr>
+            <p:ph type="body" sz="quarter" idx="13"/>
+          </p:nvPr>
+        </p:nvSpPr>
+        <p:spPr/>
         <p:txBody>
           <a:bodyPr/>
           <a:lstStyle/>
           <a:p>
-            <a:pPr>
-              <a:lnSpc>
-                <a:spcPct val="140000"/>
-              </a:lnSpc>
-              <a:buFont typeface="Arial"/>
-              <a:buChar char="•"/>
-            </a:pPr>
-            <a:r>
-              <a:rPr lang="nb-NO" dirty="0" smtClean="0">
-                <a:solidFill>
-                  <a:srgbClr val="FF0000"/>
-                </a:solidFill>
-              </a:rPr>
-              <a:t>Navn på service</a:t>
-            </a:r>
-          </a:p>
-          <a:p>
-            <a:pPr>
-              <a:lnSpc>
-                <a:spcPct val="140000"/>
-              </a:lnSpc>
-              <a:buFont typeface="Arial"/>
-              <a:buChar char="•"/>
-            </a:pPr>
-            <a:r>
-              <a:rPr lang="nb-NO" dirty="0" smtClean="0">
-                <a:solidFill>
-                  <a:schemeClr val="accent2">
-                    <a:lumMod val="60000"/>
-                    <a:lumOff val="40000"/>
-                  </a:schemeClr>
-                </a:solidFill>
-              </a:rPr>
-              <a:t>Kildekode</a:t>
-            </a:r>
-          </a:p>
-          <a:p>
-            <a:pPr>
-              <a:lnSpc>
-                <a:spcPct val="140000"/>
-              </a:lnSpc>
-              <a:buFont typeface="Arial"/>
-              <a:buChar char="•"/>
-            </a:pPr>
-            <a:r>
-              <a:rPr lang="nb-NO" dirty="0" smtClean="0">
-                <a:solidFill>
-                  <a:srgbClr val="00B050"/>
-                </a:solidFill>
-              </a:rPr>
-              <a:t>Responstype</a:t>
-            </a:r>
-            <a:endParaRPr lang="nb-NO" dirty="0">
-              <a:solidFill>
-                <a:srgbClr val="00B050"/>
-              </a:solidFill>
-            </a:endParaRPr>
-          </a:p>
-        </p:txBody>
-      </p:sp>
-      <p:sp>
-        <p:nvSpPr>
-          <p:cNvPr id="3" name="Plassholder for lysbildenummer 2"/>
+            <a:endParaRPr lang="nb-NO"/>
+          </a:p>
+        </p:txBody>
+      </p:sp>
+      <p:sp>
+        <p:nvSpPr>
+          <p:cNvPr id="6" name="Slide Number Placeholder 5"/>
           <p:cNvSpPr>
             <a:spLocks noGrp="1"/>
           </p:cNvSpPr>
@@ -14225,87 +13600,10 @@
           </a:p>
         </p:txBody>
       </p:sp>
-      <p:sp>
-        <p:nvSpPr>
-          <p:cNvPr id="10" name="Likebent trekant 9"/>
-          <p:cNvSpPr/>
-          <p:nvPr/>
-        </p:nvSpPr>
-        <p:spPr>
-          <a:xfrm rot="5400000">
-            <a:off x="3996730" y="628328"/>
-            <a:ext cx="288032" cy="288032"/>
-          </a:xfrm>
-          <a:prstGeom prst="triangle">
-            <a:avLst/>
-          </a:prstGeom>
-          <a:solidFill>
-            <a:schemeClr val="bg1">
-              <a:lumMod val="95000"/>
-            </a:schemeClr>
-          </a:solidFill>
-          <a:ln>
-            <a:noFill/>
-          </a:ln>
-        </p:spPr>
-        <p:style>
-          <a:lnRef idx="2">
-            <a:schemeClr val="accent1">
-              <a:shade val="50000"/>
-            </a:schemeClr>
-          </a:lnRef>
-          <a:fillRef idx="1">
-            <a:schemeClr val="accent1"/>
-          </a:fillRef>
-          <a:effectRef idx="0">
-            <a:schemeClr val="accent1"/>
-          </a:effectRef>
-          <a:fontRef idx="minor">
-            <a:schemeClr val="lt1"/>
-          </a:fontRef>
-        </p:style>
-        <p:txBody>
-          <a:bodyPr rtlCol="0" anchor="ctr"/>
-          <a:lstStyle/>
-          <a:p>
-            <a:pPr algn="ctr"/>
-            <a:endParaRPr lang="nb-NO"/>
-          </a:p>
-        </p:txBody>
-      </p:sp>
-      <p:pic>
-        <p:nvPicPr>
-          <p:cNvPr id="12" name="Picture Placeholder 11"/>
-          <p:cNvPicPr>
-            <a:picLocks noGrp="1" noChangeAspect="1"/>
-          </p:cNvPicPr>
-          <p:nvPr>
-            <p:ph type="pic" sz="quarter" idx="14"/>
-          </p:nvPr>
-        </p:nvPicPr>
-        <p:blipFill>
-          <a:blip r:embed="rId2">
-            <a:extLst>
-              <a:ext uri="{28A0092B-C50C-407E-A947-70E740481C1C}">
-                <a14:useLocalDpi xmlns:a14="http://schemas.microsoft.com/office/drawing/2010/main" val="0"/>
-              </a:ext>
-            </a:extLst>
-          </a:blip>
-          <a:stretch>
-            <a:fillRect/>
-          </a:stretch>
-        </p:blipFill>
-        <p:spPr>
-          <a:xfrm>
-            <a:off x="2358190" y="505455"/>
-            <a:ext cx="6787398" cy="4461891"/>
-          </a:xfrm>
-        </p:spPr>
-      </p:pic>
     </p:spTree>
     <p:extLst>
       <p:ext uri="{BB962C8B-B14F-4D97-AF65-F5344CB8AC3E}">
-        <p14:creationId xmlns:p14="http://schemas.microsoft.com/office/powerpoint/2010/main" val="1403296328"/>
+        <p14:creationId xmlns:p14="http://schemas.microsoft.com/office/powerpoint/2010/main" val="2273899268"/>
       </p:ext>
     </p:extLst>
   </p:cSld>
@@ -14341,58 +13639,92 @@
       </p:grpSpPr>
       <p:sp>
         <p:nvSpPr>
-          <p:cNvPr id="2" name="Tittel 1"/>
-          <p:cNvSpPr>
-            <a:spLocks noGrp="1"/>
-          </p:cNvSpPr>
-          <p:nvPr>
-            <p:ph type="ctrTitle"/>
-          </p:nvPr>
-        </p:nvSpPr>
-        <p:spPr/>
+          <p:cNvPr id="2" name="Title 1"/>
+          <p:cNvSpPr>
+            <a:spLocks noGrp="1"/>
+          </p:cNvSpPr>
+          <p:nvPr>
+            <p:ph type="title"/>
+          </p:nvPr>
+        </p:nvSpPr>
+        <p:spPr>
+          <a:xfrm>
+            <a:off x="392391" y="561670"/>
+            <a:ext cx="3604339" cy="276999"/>
+          </a:xfrm>
+        </p:spPr>
         <p:txBody>
           <a:bodyPr/>
           <a:lstStyle/>
           <a:p>
             <a:r>
               <a:rPr lang="nb-NO" dirty="0" smtClean="0"/>
-              <a:t>SWP EKSAMEN</a:t>
+              <a:t>Grafer og Mengder</a:t>
             </a:r>
             <a:endParaRPr lang="nb-NO" dirty="0"/>
           </a:p>
         </p:txBody>
       </p:sp>
-      <p:pic>
-        <p:nvPicPr>
-          <p:cNvPr id="4" name="Plassholder for bilde 3"/>
-          <p:cNvPicPr>
-            <a:picLocks noGrp="1" noChangeAspect="1"/>
-          </p:cNvPicPr>
-          <p:nvPr>
-            <p:ph type="pic" sz="quarter" idx="11"/>
-          </p:nvPr>
-        </p:nvPicPr>
-        <p:blipFill rotWithShape="1">
-          <a:blip r:embed="rId2">
-            <a:extLst>
-              <a:ext uri="{28A0092B-C50C-407E-A947-70E740481C1C}">
-                <a14:useLocalDpi xmlns:a14="http://schemas.microsoft.com/office/drawing/2010/main" val="0"/>
-              </a:ext>
-            </a:extLst>
-          </a:blip>
-          <a:srcRect l="-12060" t="-10000" r="-15165" b="-1"/>
-          <a:stretch/>
-        </p:blipFill>
-        <p:spPr>
-          <a:xfrm>
-            <a:off x="3132634" y="700336"/>
-            <a:ext cx="2952328" cy="1584176"/>
-          </a:xfrm>
-        </p:spPr>
-      </p:pic>
-      <p:sp>
-        <p:nvSpPr>
-          <p:cNvPr id="8" name="Plassholder for lysbildenummer 7"/>
+      <p:sp>
+        <p:nvSpPr>
+          <p:cNvPr id="3" name="Content Placeholder 2"/>
+          <p:cNvSpPr>
+            <a:spLocks noGrp="1"/>
+          </p:cNvSpPr>
+          <p:nvPr>
+            <p:ph idx="1"/>
+          </p:nvPr>
+        </p:nvSpPr>
+        <p:spPr>
+          <a:xfrm>
+            <a:off x="371481" y="1060376"/>
+            <a:ext cx="3388315" cy="3631306"/>
+          </a:xfrm>
+        </p:spPr>
+        <p:txBody>
+          <a:bodyPr>
+            <a:normAutofit/>
+          </a:bodyPr>
+          <a:lstStyle/>
+          <a:p>
+            <a:endParaRPr lang="nb-NO" sz="1600" dirty="0"/>
+          </a:p>
+        </p:txBody>
+      </p:sp>
+      <p:sp>
+        <p:nvSpPr>
+          <p:cNvPr id="4" name="Picture Placeholder 3"/>
+          <p:cNvSpPr>
+            <a:spLocks noGrp="1"/>
+          </p:cNvSpPr>
+          <p:nvPr>
+            <p:ph type="pic" sz="quarter" idx="14"/>
+          </p:nvPr>
+        </p:nvSpPr>
+        <p:spPr/>
+      </p:sp>
+      <p:sp>
+        <p:nvSpPr>
+          <p:cNvPr id="5" name="Text Placeholder 4"/>
+          <p:cNvSpPr>
+            <a:spLocks noGrp="1"/>
+          </p:cNvSpPr>
+          <p:nvPr>
+            <p:ph type="body" sz="quarter" idx="13"/>
+          </p:nvPr>
+        </p:nvSpPr>
+        <p:spPr/>
+        <p:txBody>
+          <a:bodyPr/>
+          <a:lstStyle/>
+          <a:p>
+            <a:endParaRPr lang="nb-NO"/>
+          </a:p>
+        </p:txBody>
+      </p:sp>
+      <p:sp>
+        <p:nvSpPr>
+          <p:cNvPr id="6" name="Slide Number Placeholder 5"/>
           <p:cNvSpPr>
             <a:spLocks noGrp="1"/>
           </p:cNvSpPr>
@@ -14417,7 +13749,7 @@
     </p:spTree>
     <p:extLst>
       <p:ext uri="{BB962C8B-B14F-4D97-AF65-F5344CB8AC3E}">
-        <p14:creationId xmlns:p14="http://schemas.microsoft.com/office/powerpoint/2010/main" val="2982284999"/>
+        <p14:creationId xmlns:p14="http://schemas.microsoft.com/office/powerpoint/2010/main" val="1101189174"/>
       </p:ext>
     </p:extLst>
   </p:cSld>
@@ -14453,7 +13785,7 @@
       </p:grpSpPr>
       <p:sp>
         <p:nvSpPr>
-          <p:cNvPr id="5" name="Tittel 4"/>
+          <p:cNvPr id="2" name="Title 1"/>
           <p:cNvSpPr>
             <a:spLocks noGrp="1"/>
           </p:cNvSpPr>
@@ -14463,8 +13795,8 @@
         </p:nvSpPr>
         <p:spPr>
           <a:xfrm>
-            <a:off x="392391" y="561670"/>
-            <a:ext cx="3388315" cy="276999"/>
+            <a:off x="421064" y="363892"/>
+            <a:ext cx="8231029" cy="276999"/>
           </a:xfrm>
         </p:spPr>
         <p:txBody>
@@ -14473,7 +13805,7 @@
           <a:p>
             <a:r>
               <a:rPr lang="nb-NO" dirty="0" smtClean="0"/>
-              <a:t>TITTEL</a:t>
+              <a:t>LA oss bygge en Model</a:t>
             </a:r>
             <a:endParaRPr lang="nb-NO" dirty="0"/>
           </a:p>
@@ -14481,7 +13813,7 @@
       </p:sp>
       <p:sp>
         <p:nvSpPr>
-          <p:cNvPr id="6" name="Plassholder for innhold 5"/>
+          <p:cNvPr id="3" name="Content Placeholder 2"/>
           <p:cNvSpPr>
             <a:spLocks noGrp="1"/>
           </p:cNvSpPr>
@@ -14489,138 +13821,75 @@
             <p:ph idx="1"/>
           </p:nvPr>
         </p:nvSpPr>
-        <p:spPr>
-          <a:xfrm>
-            <a:off x="392449" y="1296162"/>
-            <a:ext cx="3388315" cy="1636422"/>
-          </a:xfrm>
-        </p:spPr>
+        <p:spPr/>
+        <p:txBody>
+          <a:bodyPr>
+            <a:normAutofit/>
+          </a:bodyPr>
+          <a:lstStyle/>
+          <a:p>
+            <a:r>
+              <a:rPr lang="nb-NO" sz="1600" dirty="0" smtClean="0"/>
+              <a:t>Spesifikasjon</a:t>
+            </a:r>
+          </a:p>
+          <a:p>
+            <a:pPr lvl="1"/>
+            <a:r>
+              <a:rPr lang="nb-NO" sz="1600" dirty="0" smtClean="0"/>
+              <a:t>Personobjekt, skal ha:</a:t>
+            </a:r>
+          </a:p>
+          <a:p>
+            <a:pPr lvl="2"/>
+            <a:r>
+              <a:rPr lang="nb-NO" sz="1600" dirty="0" smtClean="0"/>
+              <a:t>Fornavn, etternavn, alder og studieretning</a:t>
+            </a:r>
+          </a:p>
+          <a:p>
+            <a:pPr lvl="2"/>
+            <a:r>
+              <a:rPr lang="nb-NO" sz="1600" dirty="0" smtClean="0"/>
+              <a:t>Oversikt over hvem han/hun kjenner og hvilke filmer han/hun har sett</a:t>
+            </a:r>
+            <a:endParaRPr lang="nb-NO" sz="1600" dirty="0"/>
+          </a:p>
+          <a:p>
+            <a:pPr marL="408239" lvl="1" indent="0">
+              <a:buNone/>
+            </a:pPr>
+            <a:endParaRPr lang="nb-NO" sz="1600" dirty="0" smtClean="0"/>
+          </a:p>
+        </p:txBody>
+      </p:sp>
+      <p:sp>
+        <p:nvSpPr>
+          <p:cNvPr id="4" name="Slide Number Placeholder 3"/>
+          <p:cNvSpPr>
+            <a:spLocks noGrp="1"/>
+          </p:cNvSpPr>
+          <p:nvPr>
+            <p:ph type="sldNum" sz="quarter" idx="12"/>
+          </p:nvPr>
+        </p:nvSpPr>
+        <p:spPr/>
         <p:txBody>
           <a:bodyPr/>
           <a:lstStyle/>
           <a:p>
-            <a:pPr>
-              <a:lnSpc>
-                <a:spcPct val="140000"/>
-              </a:lnSpc>
-              <a:buFont typeface="Arial"/>
-              <a:buChar char="•"/>
-            </a:pPr>
-            <a:r>
-              <a:rPr lang="nb-NO" dirty="0" smtClean="0"/>
-              <a:t>Tekst</a:t>
-            </a:r>
-            <a:endParaRPr lang="nb-NO" dirty="0"/>
-          </a:p>
-        </p:txBody>
-      </p:sp>
-      <p:sp>
-        <p:nvSpPr>
-          <p:cNvPr id="7" name="Plassholder for tekst 6"/>
-          <p:cNvSpPr>
-            <a:spLocks noGrp="1"/>
-          </p:cNvSpPr>
-          <p:nvPr>
-            <p:ph type="body" sz="quarter" idx="13"/>
-          </p:nvPr>
-        </p:nvSpPr>
-        <p:spPr/>
-        <p:txBody>
-          <a:bodyPr/>
-          <a:lstStyle/>
-          <a:p>
-            <a:endParaRPr lang="nb-NO"/>
-          </a:p>
-        </p:txBody>
-      </p:sp>
-      <p:sp>
-        <p:nvSpPr>
-          <p:cNvPr id="3" name="Plassholder for lysbildenummer 2"/>
-          <p:cNvSpPr>
-            <a:spLocks noGrp="1"/>
-          </p:cNvSpPr>
-          <p:nvPr>
-            <p:ph type="sldNum" sz="quarter" idx="4"/>
-          </p:nvPr>
-        </p:nvSpPr>
-        <p:spPr/>
-        <p:txBody>
-          <a:bodyPr/>
-          <a:lstStyle/>
-          <a:p>
             <a:fld id="{0AE548F1-6D36-4902-B57A-69A845AA9B7E}" type="slidenum">
               <a:rPr lang="nb-NO" smtClean="0"/>
-              <a:pPr/>
               <a:t>9</a:t>
             </a:fld>
             <a:endParaRPr lang="nb-NO" dirty="0"/>
           </a:p>
         </p:txBody>
       </p:sp>
-      <p:sp>
-        <p:nvSpPr>
-          <p:cNvPr id="10" name="Likebent trekant 9"/>
-          <p:cNvSpPr/>
-          <p:nvPr/>
-        </p:nvSpPr>
-        <p:spPr>
-          <a:xfrm rot="5400000">
-            <a:off x="3996730" y="628328"/>
-            <a:ext cx="288032" cy="288032"/>
-          </a:xfrm>
-          <a:prstGeom prst="triangle">
-            <a:avLst/>
-          </a:prstGeom>
-          <a:solidFill>
-            <a:schemeClr val="bg1">
-              <a:lumMod val="95000"/>
-            </a:schemeClr>
-          </a:solidFill>
-          <a:ln>
-            <a:noFill/>
-          </a:ln>
-        </p:spPr>
-        <p:style>
-          <a:lnRef idx="2">
-            <a:schemeClr val="accent1">
-              <a:shade val="50000"/>
-            </a:schemeClr>
-          </a:lnRef>
-          <a:fillRef idx="1">
-            <a:schemeClr val="accent1"/>
-          </a:fillRef>
-          <a:effectRef idx="0">
-            <a:schemeClr val="accent1"/>
-          </a:effectRef>
-          <a:fontRef idx="minor">
-            <a:schemeClr val="lt1"/>
-          </a:fontRef>
-        </p:style>
-        <p:txBody>
-          <a:bodyPr rtlCol="0" anchor="ctr"/>
-          <a:lstStyle/>
-          <a:p>
-            <a:pPr algn="ctr"/>
-            <a:endParaRPr lang="nb-NO"/>
-          </a:p>
-        </p:txBody>
-      </p:sp>
-      <p:sp>
-        <p:nvSpPr>
-          <p:cNvPr id="2" name="Picture Placeholder 1"/>
-          <p:cNvSpPr>
-            <a:spLocks noGrp="1"/>
-          </p:cNvSpPr>
-          <p:nvPr>
-            <p:ph type="pic" sz="quarter" idx="14"/>
-          </p:nvPr>
-        </p:nvSpPr>
-        <p:spPr/>
-      </p:sp>
     </p:spTree>
     <p:extLst>
       <p:ext uri="{BB962C8B-B14F-4D97-AF65-F5344CB8AC3E}">
-        <p14:creationId xmlns:p14="http://schemas.microsoft.com/office/powerpoint/2010/main" val="211131046"/>
+        <p14:creationId xmlns:p14="http://schemas.microsoft.com/office/powerpoint/2010/main" val="3729480209"/>
       </p:ext>
     </p:extLst>
   </p:cSld>

</xml_diff>

<commit_message>
logget arbeid, litt fiksing på slides
</commit_message>
<xml_diff>
--- a/SemWebKursUiB.pptx
+++ b/SemWebKursUiB.pptx
@@ -14,9 +14,9 @@
     <p:sldId id="297" r:id="rId2"/>
     <p:sldId id="300" r:id="rId3"/>
     <p:sldId id="301" r:id="rId4"/>
-    <p:sldId id="317" r:id="rId5"/>
-    <p:sldId id="316" r:id="rId6"/>
-    <p:sldId id="312" r:id="rId7"/>
+    <p:sldId id="318" r:id="rId5"/>
+    <p:sldId id="317" r:id="rId6"/>
+    <p:sldId id="316" r:id="rId7"/>
     <p:sldId id="299" r:id="rId8"/>
     <p:sldId id="306" r:id="rId9"/>
     <p:sldId id="315" r:id="rId10"/>
@@ -137,9 +137,9 @@
         <p14:section name="Om Computas" id="{7AF25A94-402D-4276-8AC2-1D8B7F8F444C}">
           <p14:sldIdLst>
             <p14:sldId id="301"/>
+            <p14:sldId id="318"/>
             <p14:sldId id="317"/>
             <p14:sldId id="316"/>
-            <p14:sldId id="312"/>
           </p14:sldIdLst>
         </p14:section>
         <p14:section name="Kurs" id="{BAF516D8-1506-4CE6-97C1-8269B0A4F6DC}">
@@ -276,7 +276,7 @@
           <a:p>
             <a:fld id="{895F6949-392E-49F2-AD8A-DBD210357DFF}" type="datetimeFigureOut">
               <a:rPr lang="nb-NO" smtClean="0"/>
-              <a:t>09.09.2014</a:t>
+              <a:t>15.09.2014</a:t>
             </a:fld>
             <a:endParaRPr lang="nb-NO"/>
           </a:p>
@@ -441,7 +441,7 @@
           <a:p>
             <a:fld id="{A1A7D92D-858F-4856-8C08-3C12FFEFD4B9}" type="datetimeFigureOut">
               <a:rPr lang="nb-NO" smtClean="0"/>
-              <a:t>09.09.2014</a:t>
+              <a:t>15.09.2014</a:t>
             </a:fld>
             <a:endParaRPr lang="nb-NO"/>
           </a:p>
@@ -11889,16 +11889,6 @@
           </a:bodyPr>
           <a:lstStyle/>
           <a:p>
-            <a:r>
-              <a:rPr lang="nb-NO" sz="1600" dirty="0" smtClean="0"/>
-              <a:t>Sette data </a:t>
-            </a:r>
-            <a:r>
-              <a:rPr lang="nb-NO" sz="1600" smtClean="0"/>
-              <a:t>i kontekst</a:t>
-            </a:r>
-          </a:p>
-          <a:p>
             <a:endParaRPr lang="nb-NO" sz="1600" dirty="0" smtClean="0"/>
           </a:p>
         </p:txBody>
@@ -12319,10 +12309,6 @@
           <a:bodyPr/>
           <a:lstStyle/>
           <a:p>
-            <a:r>
-              <a:rPr lang="nb-NO" dirty="0" smtClean="0"/>
-              <a:t>LA oss bygge en Model</a:t>
-            </a:r>
             <a:endParaRPr lang="nb-NO" dirty="0"/>
           </a:p>
         </p:txBody>
@@ -12579,7 +12565,14 @@
           <a:bodyPr/>
           <a:lstStyle/>
           <a:p>
-            <a:endParaRPr lang="nb-NO"/>
+            <a:pPr marL="0" indent="0">
+              <a:buNone/>
+            </a:pPr>
+            <a:endParaRPr lang="nb-NO" dirty="0">
+              <a:solidFill>
+                <a:schemeClr val="tx1"/>
+              </a:solidFill>
+            </a:endParaRPr>
           </a:p>
         </p:txBody>
       </p:sp>
@@ -12774,102 +12767,31 @@
           <a:p>
             <a:r>
               <a:rPr lang="nb-NO" sz="1600" dirty="0" smtClean="0"/>
-              <a:t>Om </a:t>
-            </a:r>
+              <a:t>Presentasjon av Computas</a:t>
+            </a:r>
+            <a:endParaRPr lang="nb-NO" sz="1600" dirty="0" smtClean="0"/>
+          </a:p>
+          <a:p>
             <a:r>
               <a:rPr lang="nb-NO" sz="1600" dirty="0" smtClean="0"/>
-              <a:t>Computas</a:t>
+              <a:t>Interaktivt kurs om semantisk </a:t>
+            </a:r>
+            <a:r>
+              <a:rPr lang="nb-NO" sz="1600" dirty="0"/>
+              <a:t>w</a:t>
+            </a:r>
+            <a:r>
+              <a:rPr lang="nb-NO" sz="1600" dirty="0" smtClean="0"/>
+              <a:t>eb og lenkede data</a:t>
             </a:r>
             <a:endParaRPr lang="nb-NO" sz="1600" dirty="0" smtClean="0"/>
           </a:p>
           <a:p>
             <a:r>
               <a:rPr lang="nb-NO" sz="1600" dirty="0" smtClean="0"/>
-              <a:t>Om oss</a:t>
-            </a:r>
-          </a:p>
-          <a:p>
-            <a:r>
-              <a:rPr lang="nb-NO" sz="1600" dirty="0" smtClean="0"/>
-              <a:t>Semantisk web kurs:</a:t>
-            </a:r>
-          </a:p>
-          <a:p>
-            <a:pPr lvl="1"/>
-            <a:r>
-              <a:rPr lang="nb-NO" sz="1600" dirty="0" smtClean="0"/>
-              <a:t>Litt teori</a:t>
-            </a:r>
-          </a:p>
-          <a:p>
-            <a:pPr lvl="1"/>
-            <a:r>
-              <a:rPr lang="nb-NO" sz="1600" dirty="0" smtClean="0"/>
-              <a:t>Interaktivt bygge modell</a:t>
-            </a:r>
-          </a:p>
-          <a:p>
-            <a:pPr lvl="1"/>
-            <a:r>
-              <a:rPr lang="nb-NO" sz="1600" dirty="0" smtClean="0"/>
-              <a:t>Generere data</a:t>
-            </a:r>
-          </a:p>
-          <a:p>
-            <a:pPr lvl="1"/>
-            <a:r>
-              <a:rPr lang="nb-NO" sz="1600" dirty="0" smtClean="0"/>
-              <a:t>Spørringer (SPARQL)</a:t>
-            </a:r>
-          </a:p>
-          <a:p>
-            <a:r>
-              <a:rPr lang="nb-NO" sz="1600" dirty="0" smtClean="0"/>
-              <a:t>Sosialt </a:t>
-            </a:r>
-          </a:p>
-        </p:txBody>
-      </p:sp>
-      <p:sp>
-        <p:nvSpPr>
-          <p:cNvPr id="5" name="Text Placeholder 4"/>
-          <p:cNvSpPr>
-            <a:spLocks noGrp="1"/>
-          </p:cNvSpPr>
-          <p:nvPr>
-            <p:ph type="body" sz="quarter" idx="13"/>
-          </p:nvPr>
-        </p:nvSpPr>
-        <p:spPr/>
-        <p:txBody>
-          <a:bodyPr/>
-          <a:lstStyle/>
-          <a:p>
-            <a:endParaRPr lang="nb-NO" dirty="0"/>
-          </a:p>
-        </p:txBody>
-      </p:sp>
-      <p:sp>
-        <p:nvSpPr>
-          <p:cNvPr id="6" name="Slide Number Placeholder 5"/>
-          <p:cNvSpPr>
-            <a:spLocks noGrp="1"/>
-          </p:cNvSpPr>
-          <p:nvPr>
-            <p:ph type="sldNum" sz="quarter" idx="4"/>
-          </p:nvPr>
-        </p:nvSpPr>
-        <p:spPr/>
-        <p:txBody>
-          <a:bodyPr/>
-          <a:lstStyle/>
-          <a:p>
-            <a:fld id="{0AE548F1-6D36-4902-B57A-69A845AA9B7E}" type="slidenum">
-              <a:rPr lang="nb-NO" smtClean="0"/>
-              <a:pPr/>
-              <a:t>2</a:t>
-            </a:fld>
-            <a:endParaRPr lang="nb-NO" dirty="0"/>
+              <a:t>Sosialt samvær med mat og drikke</a:t>
+            </a:r>
+            <a:endParaRPr lang="nb-NO" sz="1600" dirty="0" smtClean="0"/>
           </a:p>
         </p:txBody>
       </p:sp>
@@ -12898,6 +12820,49 @@
         </p:blipFill>
         <p:spPr/>
       </p:pic>
+      <p:sp>
+        <p:nvSpPr>
+          <p:cNvPr id="5" name="Text Placeholder 4"/>
+          <p:cNvSpPr>
+            <a:spLocks noGrp="1"/>
+          </p:cNvSpPr>
+          <p:nvPr>
+            <p:ph type="body" sz="quarter" idx="13"/>
+          </p:nvPr>
+        </p:nvSpPr>
+        <p:spPr/>
+        <p:txBody>
+          <a:bodyPr/>
+          <a:lstStyle/>
+          <a:p>
+            <a:endParaRPr lang="nb-NO" dirty="0"/>
+          </a:p>
+        </p:txBody>
+      </p:sp>
+      <p:sp>
+        <p:nvSpPr>
+          <p:cNvPr id="6" name="Slide Number Placeholder 5"/>
+          <p:cNvSpPr>
+            <a:spLocks noGrp="1"/>
+          </p:cNvSpPr>
+          <p:nvPr>
+            <p:ph type="sldNum" sz="quarter" idx="4"/>
+          </p:nvPr>
+        </p:nvSpPr>
+        <p:spPr/>
+        <p:txBody>
+          <a:bodyPr/>
+          <a:lstStyle/>
+          <a:p>
+            <a:fld id="{0AE548F1-6D36-4902-B57A-69A845AA9B7E}" type="slidenum">
+              <a:rPr lang="nb-NO" smtClean="0"/>
+              <a:pPr/>
+              <a:t>2</a:t>
+            </a:fld>
+            <a:endParaRPr lang="nb-NO" dirty="0"/>
+          </a:p>
+        </p:txBody>
+      </p:sp>
     </p:spTree>
     <p:extLst>
       <p:ext uri="{BB962C8B-B14F-4D97-AF65-F5344CB8AC3E}">
@@ -13063,251 +13028,6 @@
                       </p:childTnLst>
                     </p:cTn>
                   </p:par>
-                  <p:par>
-                    <p:cTn id="15" fill="hold">
-                      <p:stCondLst>
-                        <p:cond delay="indefinite"/>
-                      </p:stCondLst>
-                      <p:childTnLst>
-                        <p:par>
-                          <p:cTn id="16" fill="hold">
-                            <p:stCondLst>
-                              <p:cond delay="0"/>
-                            </p:stCondLst>
-                            <p:childTnLst>
-                              <p:par>
-                                <p:cTn id="17" presetID="1" presetClass="entr" presetSubtype="0" fill="hold" grpId="0" nodeType="clickEffect">
-                                  <p:stCondLst>
-                                    <p:cond delay="0"/>
-                                  </p:stCondLst>
-                                  <p:childTnLst>
-                                    <p:set>
-                                      <p:cBhvr>
-                                        <p:cTn id="18" dur="1" fill="hold">
-                                          <p:stCondLst>
-                                            <p:cond delay="0"/>
-                                          </p:stCondLst>
-                                        </p:cTn>
-                                        <p:tgtEl>
-                                          <p:spTgt spid="3">
-                                            <p:txEl>
-                                              <p:pRg st="3" end="3"/>
-                                            </p:txEl>
-                                          </p:spTgt>
-                                        </p:tgtEl>
-                                        <p:attrNameLst>
-                                          <p:attrName>style.visibility</p:attrName>
-                                        </p:attrNameLst>
-                                      </p:cBhvr>
-                                      <p:to>
-                                        <p:strVal val="visible"/>
-                                      </p:to>
-                                    </p:set>
-                                  </p:childTnLst>
-                                </p:cTn>
-                              </p:par>
-                            </p:childTnLst>
-                          </p:cTn>
-                        </p:par>
-                      </p:childTnLst>
-                    </p:cTn>
-                  </p:par>
-                  <p:par>
-                    <p:cTn id="19" fill="hold">
-                      <p:stCondLst>
-                        <p:cond delay="indefinite"/>
-                      </p:stCondLst>
-                      <p:childTnLst>
-                        <p:par>
-                          <p:cTn id="20" fill="hold">
-                            <p:stCondLst>
-                              <p:cond delay="0"/>
-                            </p:stCondLst>
-                            <p:childTnLst>
-                              <p:par>
-                                <p:cTn id="21" presetID="1" presetClass="entr" presetSubtype="0" fill="hold" grpId="0" nodeType="clickEffect">
-                                  <p:stCondLst>
-                                    <p:cond delay="0"/>
-                                  </p:stCondLst>
-                                  <p:childTnLst>
-                                    <p:set>
-                                      <p:cBhvr>
-                                        <p:cTn id="22" dur="1" fill="hold">
-                                          <p:stCondLst>
-                                            <p:cond delay="0"/>
-                                          </p:stCondLst>
-                                        </p:cTn>
-                                        <p:tgtEl>
-                                          <p:spTgt spid="3">
-                                            <p:txEl>
-                                              <p:pRg st="4" end="4"/>
-                                            </p:txEl>
-                                          </p:spTgt>
-                                        </p:tgtEl>
-                                        <p:attrNameLst>
-                                          <p:attrName>style.visibility</p:attrName>
-                                        </p:attrNameLst>
-                                      </p:cBhvr>
-                                      <p:to>
-                                        <p:strVal val="visible"/>
-                                      </p:to>
-                                    </p:set>
-                                  </p:childTnLst>
-                                </p:cTn>
-                              </p:par>
-                            </p:childTnLst>
-                          </p:cTn>
-                        </p:par>
-                      </p:childTnLst>
-                    </p:cTn>
-                  </p:par>
-                  <p:par>
-                    <p:cTn id="23" fill="hold">
-                      <p:stCondLst>
-                        <p:cond delay="indefinite"/>
-                      </p:stCondLst>
-                      <p:childTnLst>
-                        <p:par>
-                          <p:cTn id="24" fill="hold">
-                            <p:stCondLst>
-                              <p:cond delay="0"/>
-                            </p:stCondLst>
-                            <p:childTnLst>
-                              <p:par>
-                                <p:cTn id="25" presetID="1" presetClass="entr" presetSubtype="0" fill="hold" grpId="0" nodeType="clickEffect">
-                                  <p:stCondLst>
-                                    <p:cond delay="0"/>
-                                  </p:stCondLst>
-                                  <p:childTnLst>
-                                    <p:set>
-                                      <p:cBhvr>
-                                        <p:cTn id="26" dur="1" fill="hold">
-                                          <p:stCondLst>
-                                            <p:cond delay="0"/>
-                                          </p:stCondLst>
-                                        </p:cTn>
-                                        <p:tgtEl>
-                                          <p:spTgt spid="3">
-                                            <p:txEl>
-                                              <p:pRg st="5" end="5"/>
-                                            </p:txEl>
-                                          </p:spTgt>
-                                        </p:tgtEl>
-                                        <p:attrNameLst>
-                                          <p:attrName>style.visibility</p:attrName>
-                                        </p:attrNameLst>
-                                      </p:cBhvr>
-                                      <p:to>
-                                        <p:strVal val="visible"/>
-                                      </p:to>
-                                    </p:set>
-                                  </p:childTnLst>
-                                </p:cTn>
-                              </p:par>
-                            </p:childTnLst>
-                          </p:cTn>
-                        </p:par>
-                      </p:childTnLst>
-                    </p:cTn>
-                  </p:par>
-                  <p:par>
-                    <p:cTn id="27" fill="hold">
-                      <p:stCondLst>
-                        <p:cond delay="indefinite"/>
-                      </p:stCondLst>
-                      <p:childTnLst>
-                        <p:par>
-                          <p:cTn id="28" fill="hold">
-                            <p:stCondLst>
-                              <p:cond delay="0"/>
-                            </p:stCondLst>
-                            <p:childTnLst>
-                              <p:par>
-                                <p:cTn id="29" presetID="1" presetClass="entr" presetSubtype="0" fill="hold" grpId="0" nodeType="clickEffect">
-                                  <p:stCondLst>
-                                    <p:cond delay="0"/>
-                                  </p:stCondLst>
-                                  <p:childTnLst>
-                                    <p:set>
-                                      <p:cBhvr>
-                                        <p:cTn id="30" dur="1" fill="hold">
-                                          <p:stCondLst>
-                                            <p:cond delay="0"/>
-                                          </p:stCondLst>
-                                        </p:cTn>
-                                        <p:tgtEl>
-                                          <p:spTgt spid="3">
-                                            <p:txEl>
-                                              <p:pRg st="6" end="6"/>
-                                            </p:txEl>
-                                          </p:spTgt>
-                                        </p:tgtEl>
-                                        <p:attrNameLst>
-                                          <p:attrName>style.visibility</p:attrName>
-                                        </p:attrNameLst>
-                                      </p:cBhvr>
-                                      <p:to>
-                                        <p:strVal val="visible"/>
-                                      </p:to>
-                                    </p:set>
-                                  </p:childTnLst>
-                                </p:cTn>
-                              </p:par>
-                            </p:childTnLst>
-                          </p:cTn>
-                        </p:par>
-                      </p:childTnLst>
-                    </p:cTn>
-                  </p:par>
-                  <p:par>
-                    <p:cTn id="31" fill="hold">
-                      <p:stCondLst>
-                        <p:cond delay="indefinite"/>
-                      </p:stCondLst>
-                      <p:childTnLst>
-                        <p:par>
-                          <p:cTn id="32" fill="hold">
-                            <p:stCondLst>
-                              <p:cond delay="0"/>
-                            </p:stCondLst>
-                            <p:childTnLst>
-                              <p:par>
-                                <p:cTn id="33" presetID="1" presetClass="entr" presetSubtype="0" fill="hold" grpId="0" nodeType="clickEffect">
-                                  <p:stCondLst>
-                                    <p:cond delay="0"/>
-                                  </p:stCondLst>
-                                  <p:childTnLst>
-                                    <p:set>
-                                      <p:cBhvr>
-                                        <p:cTn id="34" dur="1" fill="hold">
-                                          <p:stCondLst>
-                                            <p:cond delay="0"/>
-                                          </p:stCondLst>
-                                        </p:cTn>
-                                        <p:tgtEl>
-                                          <p:spTgt spid="3">
-                                            <p:txEl>
-                                              <p:pRg st="7" end="7"/>
-                                            </p:txEl>
-                                          </p:spTgt>
-                                        </p:tgtEl>
-                                        <p:attrNameLst>
-                                          <p:attrName>style.visibility</p:attrName>
-                                        </p:attrNameLst>
-                                      </p:cBhvr>
-                                      <p:to>
-                                        <p:strVal val="visible"/>
-                                      </p:to>
-                                    </p:set>
-                                  </p:childTnLst>
-                                </p:cTn>
-                              </p:par>
-                            </p:childTnLst>
-                          </p:cTn>
-                        </p:par>
-                      </p:childTnLst>
-                    </p:cTn>
-                  </p:par>
                 </p:childTnLst>
               </p:cTn>
               <p:prevCondLst>
@@ -13463,8 +13183,13 @@
             <a:pPr lvl="1"/>
             <a:r>
               <a:rPr lang="nb-NO" dirty="0" smtClean="0"/>
-              <a:t>90% har mastergrad eller høyere utdanning</a:t>
-            </a:r>
+              <a:t>90% har mastergrad eller </a:t>
+            </a:r>
+            <a:r>
+              <a:rPr lang="nb-NO" dirty="0" smtClean="0"/>
+              <a:t>tilsvarende</a:t>
+            </a:r>
+            <a:endParaRPr lang="nb-NO" dirty="0" smtClean="0"/>
           </a:p>
           <a:p>
             <a:pPr lvl="1"/>
@@ -13510,7 +13235,7 @@
               </a:ext>
             </a:extLst>
           </a:blip>
-          <a:srcRect t="25008" b="25008"/>
+          <a:srcRect t="25005" b="25005"/>
           <a:stretch>
             <a:fillRect/>
           </a:stretch>
@@ -13619,7 +13344,7 @@
           <a:p>
             <a:r>
               <a:rPr lang="nb-NO" dirty="0" smtClean="0"/>
-              <a:t>Jobbe i Computas</a:t>
+              <a:t>Om Oss</a:t>
             </a:r>
             <a:endParaRPr lang="nb-NO" dirty="0"/>
           </a:p>
@@ -13642,9 +13367,115 @@
           </a:bodyPr>
           <a:lstStyle/>
           <a:p>
-            <a:endParaRPr lang="nb-NO" sz="1600" dirty="0"/>
-          </a:p>
-        </p:txBody>
+            <a:r>
+              <a:rPr lang="nb-NO" dirty="0" smtClean="0"/>
+              <a:t>Alexander Rosbach</a:t>
+            </a:r>
+          </a:p>
+          <a:p>
+            <a:pPr lvl="1"/>
+            <a:r>
+              <a:rPr lang="nb-NO" dirty="0" smtClean="0"/>
+              <a:t>Ansatt 5.8 2013</a:t>
+            </a:r>
+          </a:p>
+          <a:p>
+            <a:pPr lvl="1"/>
+            <a:r>
+              <a:rPr lang="nb-NO" dirty="0" smtClean="0"/>
+              <a:t>Master i programutviklingsteori ved </a:t>
+            </a:r>
+            <a:r>
+              <a:rPr lang="nb-NO" dirty="0" smtClean="0"/>
+              <a:t>UiB</a:t>
+            </a:r>
+          </a:p>
+          <a:p>
+            <a:pPr lvl="1"/>
+            <a:r>
+              <a:rPr lang="nb-NO" dirty="0" smtClean="0"/>
+              <a:t>Fikk jobb etter universitetsbesøk</a:t>
+            </a:r>
+            <a:r>
+              <a:rPr lang="nb-NO" dirty="0" smtClean="0"/>
+              <a:t> </a:t>
+            </a:r>
+            <a:endParaRPr lang="nb-NO" dirty="0" smtClean="0"/>
+          </a:p>
+          <a:p>
+            <a:r>
+              <a:rPr lang="nb-NO" dirty="0" smtClean="0"/>
+              <a:t>Lisa Halvorsen</a:t>
+            </a:r>
+          </a:p>
+          <a:p>
+            <a:pPr lvl="1"/>
+            <a:r>
+              <a:rPr lang="nb-NO" dirty="0" smtClean="0"/>
+              <a:t>Ansatt 5.8. 2013</a:t>
+            </a:r>
+          </a:p>
+          <a:p>
+            <a:pPr lvl="1"/>
+            <a:r>
+              <a:rPr lang="nb-NO" dirty="0" smtClean="0"/>
+              <a:t>Master i informasjonsvitenskap ved UiB </a:t>
+            </a:r>
+            <a:endParaRPr lang="nb-NO" dirty="0" smtClean="0"/>
+          </a:p>
+          <a:p>
+            <a:pPr lvl="1"/>
+            <a:r>
+              <a:rPr lang="nb-NO" dirty="0" smtClean="0"/>
+              <a:t>Fikk jobb etter sommerjobb</a:t>
+            </a:r>
+            <a:endParaRPr lang="nb-NO" dirty="0" smtClean="0"/>
+          </a:p>
+          <a:p>
+            <a:r>
+              <a:rPr lang="nb-NO" dirty="0" smtClean="0"/>
+              <a:t>Torbjørn Tessem</a:t>
+            </a:r>
+          </a:p>
+          <a:p>
+            <a:pPr lvl="1"/>
+            <a:r>
+              <a:rPr lang="nb-NO" dirty="0" smtClean="0"/>
+              <a:t>Ansatt 1.1. 2014</a:t>
+            </a:r>
+          </a:p>
+          <a:p>
+            <a:pPr lvl="1"/>
+            <a:r>
+              <a:rPr lang="nb-NO" dirty="0" smtClean="0"/>
+              <a:t>Master i algoritmer ved </a:t>
+            </a:r>
+            <a:r>
+              <a:rPr lang="nb-NO" dirty="0" smtClean="0"/>
+              <a:t>UiB</a:t>
+            </a:r>
+          </a:p>
+          <a:p>
+            <a:pPr lvl="1"/>
+            <a:r>
+              <a:rPr lang="nb-NO" dirty="0" smtClean="0"/>
+              <a:t>Ble rekruttert av </a:t>
+            </a:r>
+            <a:endParaRPr lang="nb-NO" dirty="0"/>
+          </a:p>
+        </p:txBody>
+      </p:sp>
+      <p:sp>
+        <p:nvSpPr>
+          <p:cNvPr id="9" name="Picture Placeholder 8"/>
+          <p:cNvSpPr>
+            <a:spLocks noGrp="1"/>
+          </p:cNvSpPr>
+          <p:nvPr>
+            <p:ph type="pic" sz="quarter" idx="14"/>
+          </p:nvPr>
+        </p:nvSpPr>
+        <p:spPr/>
       </p:sp>
       <p:sp>
         <p:nvSpPr>
@@ -13689,22 +13520,10 @@
           </a:p>
         </p:txBody>
       </p:sp>
-      <p:sp>
-        <p:nvSpPr>
-          <p:cNvPr id="11" name="Picture Placeholder 10"/>
-          <p:cNvSpPr>
-            <a:spLocks noGrp="1"/>
-          </p:cNvSpPr>
-          <p:nvPr>
-            <p:ph type="pic" sz="quarter" idx="14"/>
-          </p:nvPr>
-        </p:nvSpPr>
-        <p:spPr/>
-      </p:sp>
     </p:spTree>
     <p:extLst>
       <p:ext uri="{BB962C8B-B14F-4D97-AF65-F5344CB8AC3E}">
-        <p14:creationId xmlns:p14="http://schemas.microsoft.com/office/powerpoint/2010/main" val="2450697418"/>
+        <p14:creationId xmlns:p14="http://schemas.microsoft.com/office/powerpoint/2010/main" val="4031707159"/>
       </p:ext>
     </p:extLst>
   </p:cSld>
@@ -13759,8 +13578,8 @@
           <a:lstStyle/>
           <a:p>
             <a:r>
-              <a:rPr lang="nb-NO" dirty="0" err="1" smtClean="0"/>
-              <a:t>SommerJobb</a:t>
+              <a:rPr lang="nb-NO" dirty="0" smtClean="0"/>
+              <a:t>Jobbe i Computas</a:t>
             </a:r>
             <a:endParaRPr lang="nb-NO" dirty="0"/>
           </a:p>
@@ -13786,6 +13605,18 @@
             <a:endParaRPr lang="nb-NO" sz="1600" dirty="0"/>
           </a:p>
         </p:txBody>
+      </p:sp>
+      <p:sp>
+        <p:nvSpPr>
+          <p:cNvPr id="11" name="Picture Placeholder 10"/>
+          <p:cNvSpPr>
+            <a:spLocks noGrp="1"/>
+          </p:cNvSpPr>
+          <p:nvPr>
+            <p:ph type="pic" sz="quarter" idx="14"/>
+          </p:nvPr>
+        </p:nvSpPr>
+        <p:spPr/>
       </p:sp>
       <p:sp>
         <p:nvSpPr>
@@ -13830,22 +13661,10 @@
           </a:p>
         </p:txBody>
       </p:sp>
-      <p:sp>
-        <p:nvSpPr>
-          <p:cNvPr id="11" name="Picture Placeholder 10"/>
-          <p:cNvSpPr>
-            <a:spLocks noGrp="1"/>
-          </p:cNvSpPr>
-          <p:nvPr>
-            <p:ph type="pic" sz="quarter" idx="14"/>
-          </p:nvPr>
-        </p:nvSpPr>
-        <p:spPr/>
-      </p:sp>
     </p:spTree>
     <p:extLst>
       <p:ext uri="{BB962C8B-B14F-4D97-AF65-F5344CB8AC3E}">
-        <p14:creationId xmlns:p14="http://schemas.microsoft.com/office/powerpoint/2010/main" val="3664865175"/>
+        <p14:creationId xmlns:p14="http://schemas.microsoft.com/office/powerpoint/2010/main" val="2450697418"/>
       </p:ext>
     </p:extLst>
   </p:cSld>
@@ -13900,8 +13719,8 @@
           <a:lstStyle/>
           <a:p>
             <a:r>
-              <a:rPr lang="nb-NO" dirty="0" smtClean="0"/>
-              <a:t>Om Oss</a:t>
+              <a:rPr lang="nb-NO" dirty="0" err="1" smtClean="0"/>
+              <a:t>SommerJobb</a:t>
             </a:r>
             <a:endParaRPr lang="nb-NO" dirty="0"/>
           </a:p>
@@ -13924,73 +13743,21 @@
           </a:bodyPr>
           <a:lstStyle/>
           <a:p>
-            <a:r>
-              <a:rPr lang="nb-NO" dirty="0" smtClean="0"/>
-              <a:t>Alexander Rosbach</a:t>
-            </a:r>
-          </a:p>
-          <a:p>
-            <a:pPr lvl="1"/>
-            <a:r>
-              <a:rPr lang="nb-NO" dirty="0" smtClean="0"/>
-              <a:t>Ansatt 5.8 2013</a:t>
-            </a:r>
-          </a:p>
-          <a:p>
-            <a:pPr lvl="1"/>
-            <a:r>
-              <a:rPr lang="nb-NO" dirty="0" smtClean="0"/>
-              <a:t>Master i programutviklingsteori ved UiB </a:t>
-            </a:r>
-          </a:p>
-          <a:p>
-            <a:r>
-              <a:rPr lang="nb-NO" dirty="0" smtClean="0"/>
-              <a:t>Lisa Halvorsen</a:t>
-            </a:r>
-          </a:p>
-          <a:p>
-            <a:pPr lvl="1"/>
-            <a:r>
-              <a:rPr lang="nb-NO" dirty="0" smtClean="0"/>
-              <a:t>Ansatt 5.8. 2013</a:t>
-            </a:r>
-          </a:p>
-          <a:p>
-            <a:pPr lvl="1"/>
-            <a:r>
-              <a:rPr lang="nb-NO" dirty="0" smtClean="0"/>
-              <a:t>Master i informasjonsvitenskap ved UiB </a:t>
-            </a:r>
-          </a:p>
-          <a:p>
-            <a:r>
-              <a:rPr lang="nb-NO" dirty="0" smtClean="0"/>
-              <a:t>Torbjørn Tessem</a:t>
-            </a:r>
-          </a:p>
-          <a:p>
-            <a:pPr lvl="1"/>
-            <a:r>
-              <a:rPr lang="nb-NO" dirty="0" smtClean="0"/>
-              <a:t>Ansatt 1.1. 2014</a:t>
-            </a:r>
-          </a:p>
-          <a:p>
-            <a:pPr lvl="1"/>
-            <a:r>
-              <a:rPr lang="nb-NO" dirty="0" smtClean="0"/>
-              <a:t>Master i algoritmer ved UiB </a:t>
-            </a:r>
-            <a:endParaRPr lang="nb-NO" dirty="0"/>
-          </a:p>
-          <a:p>
-            <a:r>
-              <a:rPr lang="nb-NO" dirty="0" smtClean="0"/>
-              <a:t> …</a:t>
-            </a:r>
-          </a:p>
-        </p:txBody>
+            <a:endParaRPr lang="nb-NO" sz="1600" dirty="0"/>
+          </a:p>
+        </p:txBody>
+      </p:sp>
+      <p:sp>
+        <p:nvSpPr>
+          <p:cNvPr id="11" name="Picture Placeholder 10"/>
+          <p:cNvSpPr>
+            <a:spLocks noGrp="1"/>
+          </p:cNvSpPr>
+          <p:nvPr>
+            <p:ph type="pic" sz="quarter" idx="14"/>
+          </p:nvPr>
+        </p:nvSpPr>
+        <p:spPr/>
       </p:sp>
       <p:sp>
         <p:nvSpPr>
@@ -14035,22 +13802,10 @@
           </a:p>
         </p:txBody>
       </p:sp>
-      <p:sp>
-        <p:nvSpPr>
-          <p:cNvPr id="9" name="Picture Placeholder 8"/>
-          <p:cNvSpPr>
-            <a:spLocks noGrp="1"/>
-          </p:cNvSpPr>
-          <p:nvPr>
-            <p:ph type="pic" sz="quarter" idx="14"/>
-          </p:nvPr>
-        </p:nvSpPr>
-        <p:spPr/>
-      </p:sp>
     </p:spTree>
     <p:extLst>
       <p:ext uri="{BB962C8B-B14F-4D97-AF65-F5344CB8AC3E}">
-        <p14:creationId xmlns:p14="http://schemas.microsoft.com/office/powerpoint/2010/main" val="1963146835"/>
+        <p14:creationId xmlns:p14="http://schemas.microsoft.com/office/powerpoint/2010/main" val="3664865175"/>
       </p:ext>
     </p:extLst>
   </p:cSld>
@@ -14251,6 +14006,9 @@
           </a:bodyPr>
           <a:lstStyle/>
           <a:p>
+            <a:pPr marL="0" indent="0">
+              <a:buNone/>
+            </a:pPr>
             <a:endParaRPr lang="nb-NO" sz="1600" dirty="0"/>
           </a:p>
         </p:txBody>

</xml_diff>